<commit_message>
Plots mostly working. Starting to edit powerpoint.
</commit_message>
<xml_diff>
--- a/Poster.pptx
+++ b/Poster.pptx
@@ -2256,7 +2256,7 @@
               <a:effectLst/>
               <a:extLst>
                 <a:ext uri="{C572A759-6A51-4108-AA02-DFA0A04FC94B}">
-                  <ma14:wrappingTextBoxFlag xmlns:ma14="http://schemas.microsoft.com/office/mac/drawingml/2011/main" xmlns:a14="http://schemas.microsoft.com/office/drawing/2010/main" xmlns:m="http://schemas.openxmlformats.org/officeDocument/2006/math" xmlns="" val="1"/>
+                  <ma14:wrappingTextBoxFlag xmlns="" xmlns:m="http://schemas.openxmlformats.org/officeDocument/2006/math" xmlns:a14="http://schemas.microsoft.com/office/drawing/2010/main" xmlns:ma14="http://schemas.microsoft.com/office/mac/drawingml/2011/main" val="1"/>
                 </a:ext>
               </a:extLst>
             </p:spPr>
@@ -3187,7 +3187,7 @@
               <a:effectLst/>
               <a:extLst>
                 <a:ext uri="{C572A759-6A51-4108-AA02-DFA0A04FC94B}">
-                  <ma14:wrappingTextBoxFlag xmlns:ma14="http://schemas.microsoft.com/office/mac/drawingml/2011/main" xmlns:a14="http://schemas.microsoft.com/office/drawing/2010/main" xmlns:m="http://schemas.openxmlformats.org/officeDocument/2006/math" xmlns="" val="1"/>
+                  <ma14:wrappingTextBoxFlag xmlns="" xmlns:m="http://schemas.openxmlformats.org/officeDocument/2006/math" xmlns:a14="http://schemas.microsoft.com/office/drawing/2010/main" xmlns:ma14="http://schemas.microsoft.com/office/mac/drawingml/2011/main" val="1"/>
                 </a:ext>
               </a:extLst>
             </p:spPr>
@@ -3248,7 +3248,7 @@
             <a:effectLst/>
             <a:extLst>
               <a:ext uri="{C572A759-6A51-4108-AA02-DFA0A04FC94B}">
-                <ma14:wrappingTextBoxFlag xmlns:ma14="http://schemas.microsoft.com/office/mac/drawingml/2011/main" xmlns:a14="http://schemas.microsoft.com/office/drawing/2010/main" xmlns:m="http://schemas.openxmlformats.org/officeDocument/2006/math" xmlns="" val="1"/>
+                <ma14:wrappingTextBoxFlag xmlns="" xmlns:m="http://schemas.openxmlformats.org/officeDocument/2006/math" xmlns:a14="http://schemas.microsoft.com/office/drawing/2010/main" xmlns:ma14="http://schemas.microsoft.com/office/mac/drawingml/2011/main" val="1"/>
               </a:ext>
             </a:extLst>
           </p:spPr>
@@ -3410,7 +3410,7 @@
               <a:effectLst/>
               <a:extLst>
                 <a:ext uri="{C572A759-6A51-4108-AA02-DFA0A04FC94B}">
-                  <ma14:wrappingTextBoxFlag xmlns:ma14="http://schemas.microsoft.com/office/mac/drawingml/2011/main" xmlns:a14="http://schemas.microsoft.com/office/drawing/2010/main" xmlns:m="http://schemas.openxmlformats.org/officeDocument/2006/math" xmlns="" val="1"/>
+                  <ma14:wrappingTextBoxFlag xmlns="" xmlns:m="http://schemas.openxmlformats.org/officeDocument/2006/math" xmlns:a14="http://schemas.microsoft.com/office/drawing/2010/main" xmlns:ma14="http://schemas.microsoft.com/office/mac/drawingml/2011/main" val="1"/>
                 </a:ext>
               </a:extLst>
             </p:spPr>
@@ -4369,7 +4369,7 @@
                 <a:effectLst/>
                 <a:extLst>
                   <a:ext uri="{C572A759-6A51-4108-AA02-DFA0A04FC94B}">
-                    <ma14:wrappingTextBoxFlag xmlns:ma14="http://schemas.microsoft.com/office/mac/drawingml/2011/main" xmlns:a14="http://schemas.microsoft.com/office/drawing/2010/main" xmlns:m="http://schemas.openxmlformats.org/officeDocument/2006/math" xmlns="" val="1"/>
+                    <ma14:wrappingTextBoxFlag xmlns="" xmlns:m="http://schemas.openxmlformats.org/officeDocument/2006/math" xmlns:a14="http://schemas.microsoft.com/office/drawing/2010/main" xmlns:ma14="http://schemas.microsoft.com/office/mac/drawingml/2011/main" val="1"/>
                   </a:ext>
                 </a:extLst>
               </p:spPr>
@@ -4457,7 +4457,7 @@
                 <a:effectLst/>
                 <a:extLst>
                   <a:ext uri="{C572A759-6A51-4108-AA02-DFA0A04FC94B}">
-                    <ma14:wrappingTextBoxFlag xmlns:ma14="http://schemas.microsoft.com/office/mac/drawingml/2011/main" xmlns:a14="http://schemas.microsoft.com/office/drawing/2010/main" xmlns:m="http://schemas.openxmlformats.org/officeDocument/2006/math" xmlns="" val="1"/>
+                    <ma14:wrappingTextBoxFlag xmlns="" xmlns:m="http://schemas.openxmlformats.org/officeDocument/2006/math" xmlns:a14="http://schemas.microsoft.com/office/drawing/2010/main" xmlns:ma14="http://schemas.microsoft.com/office/mac/drawingml/2011/main" val="1"/>
                   </a:ext>
                 </a:extLst>
               </p:spPr>
@@ -4533,7 +4533,7 @@
               <a:effectLst/>
               <a:extLst>
                 <a:ext uri="{C572A759-6A51-4108-AA02-DFA0A04FC94B}">
-                  <ma14:wrappingTextBoxFlag xmlns:ma14="http://schemas.microsoft.com/office/mac/drawingml/2011/main" xmlns:a14="http://schemas.microsoft.com/office/drawing/2010/main" xmlns:m="http://schemas.openxmlformats.org/officeDocument/2006/math" xmlns="" val="1"/>
+                  <ma14:wrappingTextBoxFlag xmlns="" xmlns:m="http://schemas.openxmlformats.org/officeDocument/2006/math" xmlns:a14="http://schemas.microsoft.com/office/drawing/2010/main" xmlns:ma14="http://schemas.microsoft.com/office/mac/drawingml/2011/main" val="1"/>
                 </a:ext>
               </a:extLst>
             </p:spPr>
@@ -4652,7 +4652,7 @@
               <a:effectLst/>
               <a:extLst>
                 <a:ext uri="{C572A759-6A51-4108-AA02-DFA0A04FC94B}">
-                  <ma14:wrappingTextBoxFlag xmlns:ma14="http://schemas.microsoft.com/office/mac/drawingml/2011/main" xmlns:a14="http://schemas.microsoft.com/office/drawing/2010/main" xmlns:m="http://schemas.openxmlformats.org/officeDocument/2006/math" xmlns="" val="1"/>
+                  <ma14:wrappingTextBoxFlag xmlns="" xmlns:m="http://schemas.openxmlformats.org/officeDocument/2006/math" xmlns:a14="http://schemas.microsoft.com/office/drawing/2010/main" xmlns:ma14="http://schemas.microsoft.com/office/mac/drawingml/2011/main" val="1"/>
                 </a:ext>
               </a:extLst>
             </p:spPr>
@@ -4705,7 +4705,7 @@
               <a:effectLst/>
               <a:extLst>
                 <a:ext uri="{C572A759-6A51-4108-AA02-DFA0A04FC94B}">
-                  <ma14:wrappingTextBoxFlag xmlns:ma14="http://schemas.microsoft.com/office/mac/drawingml/2011/main" xmlns:a14="http://schemas.microsoft.com/office/drawing/2010/main" xmlns:m="http://schemas.openxmlformats.org/officeDocument/2006/math" xmlns="" val="1"/>
+                  <ma14:wrappingTextBoxFlag xmlns="" xmlns:m="http://schemas.openxmlformats.org/officeDocument/2006/math" xmlns:a14="http://schemas.microsoft.com/office/drawing/2010/main" xmlns:ma14="http://schemas.microsoft.com/office/mac/drawingml/2011/main" val="1"/>
                 </a:ext>
               </a:extLst>
             </p:spPr>
@@ -4757,7 +4757,7 @@
           </a:ln>
           <a:extLst>
             <a:ext uri="{C572A759-6A51-4108-AA02-DFA0A04FC94B}">
-              <ma14:wrappingTextBoxFlag xmlns:ma14="http://schemas.microsoft.com/office/mac/drawingml/2011/main" xmlns:a14="http://schemas.microsoft.com/office/drawing/2010/main" xmlns:m="http://schemas.openxmlformats.org/officeDocument/2006/math" xmlns="" val="1"/>
+              <ma14:wrappingTextBoxFlag xmlns="" xmlns:m="http://schemas.openxmlformats.org/officeDocument/2006/math" xmlns:a14="http://schemas.microsoft.com/office/drawing/2010/main" xmlns:ma14="http://schemas.microsoft.com/office/mac/drawingml/2011/main" val="1"/>
             </a:ext>
           </a:extLst>
         </p:spPr>
@@ -5677,7 +5677,7 @@
           </a:effectLst>
           <a:extLst>
             <a:ext uri="{C572A759-6A51-4108-AA02-DFA0A04FC94B}">
-              <ma14:wrappingTextBoxFlag xmlns:ma14="http://schemas.microsoft.com/office/mac/drawingml/2011/main" xmlns:a14="http://schemas.microsoft.com/office/drawing/2010/main" xmlns:m="http://schemas.openxmlformats.org/officeDocument/2006/math" xmlns="" val="1"/>
+              <ma14:wrappingTextBoxFlag xmlns="" xmlns:m="http://schemas.openxmlformats.org/officeDocument/2006/math" xmlns:a14="http://schemas.microsoft.com/office/drawing/2010/main" xmlns:ma14="http://schemas.microsoft.com/office/mac/drawingml/2011/main" val="1"/>
             </a:ext>
           </a:extLst>
         </p:spPr>
@@ -5891,7 +5891,7 @@
           </a:ln>
           <a:extLst>
             <a:ext uri="{C572A759-6A51-4108-AA02-DFA0A04FC94B}">
-              <ma14:wrappingTextBoxFlag xmlns:ma14="http://schemas.microsoft.com/office/mac/drawingml/2011/main" xmlns:a14="http://schemas.microsoft.com/office/drawing/2010/main" xmlns:m="http://schemas.openxmlformats.org/officeDocument/2006/math" xmlns="" val="1"/>
+              <ma14:wrappingTextBoxFlag xmlns="" xmlns:m="http://schemas.openxmlformats.org/officeDocument/2006/math" xmlns:a14="http://schemas.microsoft.com/office/drawing/2010/main" xmlns:ma14="http://schemas.microsoft.com/office/mac/drawingml/2011/main" val="1"/>
             </a:ext>
           </a:extLst>
         </p:spPr>
@@ -6240,7 +6240,7 @@
               <a:effectLst/>
               <a:extLst>
                 <a:ext uri="{C572A759-6A51-4108-AA02-DFA0A04FC94B}">
-                  <ma14:wrappingTextBoxFlag xmlns:ma14="http://schemas.microsoft.com/office/mac/drawingml/2011/main" xmlns:a14="http://schemas.microsoft.com/office/drawing/2010/main" xmlns:m="http://schemas.openxmlformats.org/officeDocument/2006/math" xmlns="" val="1"/>
+                  <ma14:wrappingTextBoxFlag xmlns="" xmlns:m="http://schemas.openxmlformats.org/officeDocument/2006/math" xmlns:a14="http://schemas.microsoft.com/office/drawing/2010/main" xmlns:ma14="http://schemas.microsoft.com/office/mac/drawingml/2011/main" val="1"/>
                 </a:ext>
               </a:extLst>
             </p:spPr>
@@ -7199,7 +7199,7 @@
                 <a:effectLst/>
                 <a:extLst>
                   <a:ext uri="{C572A759-6A51-4108-AA02-DFA0A04FC94B}">
-                    <ma14:wrappingTextBoxFlag xmlns:ma14="http://schemas.microsoft.com/office/mac/drawingml/2011/main" xmlns:a14="http://schemas.microsoft.com/office/drawing/2010/main" xmlns:m="http://schemas.openxmlformats.org/officeDocument/2006/math" xmlns="" val="1"/>
+                    <ma14:wrappingTextBoxFlag xmlns="" xmlns:m="http://schemas.openxmlformats.org/officeDocument/2006/math" xmlns:a14="http://schemas.microsoft.com/office/drawing/2010/main" xmlns:ma14="http://schemas.microsoft.com/office/mac/drawingml/2011/main" val="1"/>
                   </a:ext>
                 </a:extLst>
               </p:spPr>
@@ -7287,7 +7287,7 @@
                 <a:effectLst/>
                 <a:extLst>
                   <a:ext uri="{C572A759-6A51-4108-AA02-DFA0A04FC94B}">
-                    <ma14:wrappingTextBoxFlag xmlns:ma14="http://schemas.microsoft.com/office/mac/drawingml/2011/main" xmlns:a14="http://schemas.microsoft.com/office/drawing/2010/main" xmlns:m="http://schemas.openxmlformats.org/officeDocument/2006/math" xmlns="" val="1"/>
+                    <ma14:wrappingTextBoxFlag xmlns="" xmlns:m="http://schemas.openxmlformats.org/officeDocument/2006/math" xmlns:a14="http://schemas.microsoft.com/office/drawing/2010/main" xmlns:ma14="http://schemas.microsoft.com/office/mac/drawingml/2011/main" val="1"/>
                   </a:ext>
                 </a:extLst>
               </p:spPr>
@@ -7363,7 +7363,7 @@
               <a:effectLst/>
               <a:extLst>
                 <a:ext uri="{C572A759-6A51-4108-AA02-DFA0A04FC94B}">
-                  <ma14:wrappingTextBoxFlag xmlns:ma14="http://schemas.microsoft.com/office/mac/drawingml/2011/main" xmlns:a14="http://schemas.microsoft.com/office/drawing/2010/main" xmlns:m="http://schemas.openxmlformats.org/officeDocument/2006/math" xmlns="" val="1"/>
+                  <ma14:wrappingTextBoxFlag xmlns="" xmlns:m="http://schemas.openxmlformats.org/officeDocument/2006/math" xmlns:a14="http://schemas.microsoft.com/office/drawing/2010/main" xmlns:ma14="http://schemas.microsoft.com/office/mac/drawingml/2011/main" val="1"/>
                 </a:ext>
               </a:extLst>
             </p:spPr>
@@ -7482,7 +7482,7 @@
               <a:effectLst/>
               <a:extLst>
                 <a:ext uri="{C572A759-6A51-4108-AA02-DFA0A04FC94B}">
-                  <ma14:wrappingTextBoxFlag xmlns:ma14="http://schemas.microsoft.com/office/mac/drawingml/2011/main" xmlns:a14="http://schemas.microsoft.com/office/drawing/2010/main" xmlns:m="http://schemas.openxmlformats.org/officeDocument/2006/math" xmlns="" val="1"/>
+                  <ma14:wrappingTextBoxFlag xmlns="" xmlns:m="http://schemas.openxmlformats.org/officeDocument/2006/math" xmlns:a14="http://schemas.microsoft.com/office/drawing/2010/main" xmlns:ma14="http://schemas.microsoft.com/office/mac/drawingml/2011/main" val="1"/>
                 </a:ext>
               </a:extLst>
             </p:spPr>
@@ -7535,7 +7535,7 @@
               <a:effectLst/>
               <a:extLst>
                 <a:ext uri="{C572A759-6A51-4108-AA02-DFA0A04FC94B}">
-                  <ma14:wrappingTextBoxFlag xmlns:ma14="http://schemas.microsoft.com/office/mac/drawingml/2011/main" xmlns:a14="http://schemas.microsoft.com/office/drawing/2010/main" xmlns:m="http://schemas.openxmlformats.org/officeDocument/2006/math" xmlns="" val="1"/>
+                  <ma14:wrappingTextBoxFlag xmlns="" xmlns:m="http://schemas.openxmlformats.org/officeDocument/2006/math" xmlns:a14="http://schemas.microsoft.com/office/drawing/2010/main" xmlns:ma14="http://schemas.microsoft.com/office/mac/drawingml/2011/main" val="1"/>
                 </a:ext>
               </a:extLst>
             </p:spPr>
@@ -7662,7 +7662,7 @@
               <a:effectLst/>
               <a:extLst>
                 <a:ext uri="{C572A759-6A51-4108-AA02-DFA0A04FC94B}">
-                  <ma14:wrappingTextBoxFlag xmlns:ma14="http://schemas.microsoft.com/office/mac/drawingml/2011/main" xmlns:a14="http://schemas.microsoft.com/office/drawing/2010/main" xmlns:m="http://schemas.openxmlformats.org/officeDocument/2006/math" xmlns="" val="1"/>
+                  <ma14:wrappingTextBoxFlag xmlns="" xmlns:m="http://schemas.openxmlformats.org/officeDocument/2006/math" xmlns:a14="http://schemas.microsoft.com/office/drawing/2010/main" xmlns:ma14="http://schemas.microsoft.com/office/mac/drawingml/2011/main" val="1"/>
                 </a:ext>
               </a:extLst>
             </p:spPr>
@@ -8593,7 +8593,7 @@
               <a:effectLst/>
               <a:extLst>
                 <a:ext uri="{C572A759-6A51-4108-AA02-DFA0A04FC94B}">
-                  <ma14:wrappingTextBoxFlag xmlns:ma14="http://schemas.microsoft.com/office/mac/drawingml/2011/main" xmlns:a14="http://schemas.microsoft.com/office/drawing/2010/main" xmlns:m="http://schemas.openxmlformats.org/officeDocument/2006/math" xmlns="" val="1"/>
+                  <ma14:wrappingTextBoxFlag xmlns="" xmlns:m="http://schemas.openxmlformats.org/officeDocument/2006/math" xmlns:a14="http://schemas.microsoft.com/office/drawing/2010/main" xmlns:ma14="http://schemas.microsoft.com/office/mac/drawingml/2011/main" val="1"/>
                 </a:ext>
               </a:extLst>
             </p:spPr>
@@ -8654,7 +8654,7 @@
             <a:effectLst/>
             <a:extLst>
               <a:ext uri="{C572A759-6A51-4108-AA02-DFA0A04FC94B}">
-                <ma14:wrappingTextBoxFlag xmlns:ma14="http://schemas.microsoft.com/office/mac/drawingml/2011/main" xmlns:a14="http://schemas.microsoft.com/office/drawing/2010/main" xmlns:m="http://schemas.openxmlformats.org/officeDocument/2006/math" xmlns="" val="1"/>
+                <ma14:wrappingTextBoxFlag xmlns="" xmlns:m="http://schemas.openxmlformats.org/officeDocument/2006/math" xmlns:a14="http://schemas.microsoft.com/office/drawing/2010/main" xmlns:ma14="http://schemas.microsoft.com/office/mac/drawingml/2011/main" val="1"/>
               </a:ext>
             </a:extLst>
           </p:spPr>
@@ -9587,7 +9587,7 @@
           </a:effectLst>
           <a:extLst>
             <a:ext uri="{C572A759-6A51-4108-AA02-DFA0A04FC94B}">
-              <ma14:wrappingTextBoxFlag xmlns:ma14="http://schemas.microsoft.com/office/mac/drawingml/2011/main" xmlns:a14="http://schemas.microsoft.com/office/drawing/2010/main" xmlns:m="http://schemas.openxmlformats.org/officeDocument/2006/math" xmlns="" val="1"/>
+              <ma14:wrappingTextBoxFlag xmlns="" xmlns:m="http://schemas.openxmlformats.org/officeDocument/2006/math" xmlns:a14="http://schemas.microsoft.com/office/drawing/2010/main" xmlns:ma14="http://schemas.microsoft.com/office/mac/drawingml/2011/main" val="1"/>
             </a:ext>
           </a:extLst>
         </p:spPr>
@@ -10042,7 +10042,7 @@
               <a:effectLst/>
               <a:extLst>
                 <a:ext uri="{C572A759-6A51-4108-AA02-DFA0A04FC94B}">
-                  <ma14:wrappingTextBoxFlag xmlns:ma14="http://schemas.microsoft.com/office/mac/drawingml/2011/main" xmlns:a14="http://schemas.microsoft.com/office/drawing/2010/main" xmlns:m="http://schemas.openxmlformats.org/officeDocument/2006/math" xmlns="" val="1"/>
+                  <ma14:wrappingTextBoxFlag xmlns="" xmlns:m="http://schemas.openxmlformats.org/officeDocument/2006/math" xmlns:a14="http://schemas.microsoft.com/office/drawing/2010/main" xmlns:ma14="http://schemas.microsoft.com/office/mac/drawingml/2011/main" val="1"/>
                 </a:ext>
               </a:extLst>
             </p:spPr>
@@ -10973,7 +10973,7 @@
               <a:effectLst/>
               <a:extLst>
                 <a:ext uri="{C572A759-6A51-4108-AA02-DFA0A04FC94B}">
-                  <ma14:wrappingTextBoxFlag xmlns:ma14="http://schemas.microsoft.com/office/mac/drawingml/2011/main" xmlns:a14="http://schemas.microsoft.com/office/drawing/2010/main" xmlns:m="http://schemas.openxmlformats.org/officeDocument/2006/math" xmlns="" val="1"/>
+                  <ma14:wrappingTextBoxFlag xmlns="" xmlns:m="http://schemas.openxmlformats.org/officeDocument/2006/math" xmlns:a14="http://schemas.microsoft.com/office/drawing/2010/main" xmlns:ma14="http://schemas.microsoft.com/office/mac/drawingml/2011/main" val="1"/>
                 </a:ext>
               </a:extLst>
             </p:spPr>
@@ -11034,7 +11034,7 @@
             <a:effectLst/>
             <a:extLst>
               <a:ext uri="{C572A759-6A51-4108-AA02-DFA0A04FC94B}">
-                <ma14:wrappingTextBoxFlag xmlns:ma14="http://schemas.microsoft.com/office/mac/drawingml/2011/main" xmlns:a14="http://schemas.microsoft.com/office/drawing/2010/main" xmlns:m="http://schemas.openxmlformats.org/officeDocument/2006/math" xmlns="" val="1"/>
+                <ma14:wrappingTextBoxFlag xmlns="" xmlns:m="http://schemas.openxmlformats.org/officeDocument/2006/math" xmlns:a14="http://schemas.microsoft.com/office/drawing/2010/main" xmlns:ma14="http://schemas.microsoft.com/office/mac/drawingml/2011/main" val="1"/>
               </a:ext>
             </a:extLst>
           </p:spPr>
@@ -11196,7 +11196,7 @@
               <a:effectLst/>
               <a:extLst>
                 <a:ext uri="{C572A759-6A51-4108-AA02-DFA0A04FC94B}">
-                  <ma14:wrappingTextBoxFlag xmlns:ma14="http://schemas.microsoft.com/office/mac/drawingml/2011/main" xmlns:a14="http://schemas.microsoft.com/office/drawing/2010/main" xmlns:m="http://schemas.openxmlformats.org/officeDocument/2006/math" xmlns="" val="1"/>
+                  <ma14:wrappingTextBoxFlag xmlns="" xmlns:m="http://schemas.openxmlformats.org/officeDocument/2006/math" xmlns:a14="http://schemas.microsoft.com/office/drawing/2010/main" xmlns:ma14="http://schemas.microsoft.com/office/mac/drawingml/2011/main" val="1"/>
                 </a:ext>
               </a:extLst>
             </p:spPr>
@@ -12155,7 +12155,7 @@
                 <a:effectLst/>
                 <a:extLst>
                   <a:ext uri="{C572A759-6A51-4108-AA02-DFA0A04FC94B}">
-                    <ma14:wrappingTextBoxFlag xmlns:ma14="http://schemas.microsoft.com/office/mac/drawingml/2011/main" xmlns:a14="http://schemas.microsoft.com/office/drawing/2010/main" xmlns:m="http://schemas.openxmlformats.org/officeDocument/2006/math" xmlns="" val="1"/>
+                    <ma14:wrappingTextBoxFlag xmlns="" xmlns:m="http://schemas.openxmlformats.org/officeDocument/2006/math" xmlns:a14="http://schemas.microsoft.com/office/drawing/2010/main" xmlns:ma14="http://schemas.microsoft.com/office/mac/drawingml/2011/main" val="1"/>
                   </a:ext>
                 </a:extLst>
               </p:spPr>
@@ -12243,7 +12243,7 @@
                 <a:effectLst/>
                 <a:extLst>
                   <a:ext uri="{C572A759-6A51-4108-AA02-DFA0A04FC94B}">
-                    <ma14:wrappingTextBoxFlag xmlns:ma14="http://schemas.microsoft.com/office/mac/drawingml/2011/main" xmlns:a14="http://schemas.microsoft.com/office/drawing/2010/main" xmlns:m="http://schemas.openxmlformats.org/officeDocument/2006/math" xmlns="" val="1"/>
+                    <ma14:wrappingTextBoxFlag xmlns="" xmlns:m="http://schemas.openxmlformats.org/officeDocument/2006/math" xmlns:a14="http://schemas.microsoft.com/office/drawing/2010/main" xmlns:ma14="http://schemas.microsoft.com/office/mac/drawingml/2011/main" val="1"/>
                   </a:ext>
                 </a:extLst>
               </p:spPr>
@@ -12319,7 +12319,7 @@
               <a:effectLst/>
               <a:extLst>
                 <a:ext uri="{C572A759-6A51-4108-AA02-DFA0A04FC94B}">
-                  <ma14:wrappingTextBoxFlag xmlns:ma14="http://schemas.microsoft.com/office/mac/drawingml/2011/main" xmlns:a14="http://schemas.microsoft.com/office/drawing/2010/main" xmlns:m="http://schemas.openxmlformats.org/officeDocument/2006/math" xmlns="" val="1"/>
+                  <ma14:wrappingTextBoxFlag xmlns="" xmlns:m="http://schemas.openxmlformats.org/officeDocument/2006/math" xmlns:a14="http://schemas.microsoft.com/office/drawing/2010/main" xmlns:ma14="http://schemas.microsoft.com/office/mac/drawingml/2011/main" val="1"/>
                 </a:ext>
               </a:extLst>
             </p:spPr>
@@ -12438,7 +12438,7 @@
               <a:effectLst/>
               <a:extLst>
                 <a:ext uri="{C572A759-6A51-4108-AA02-DFA0A04FC94B}">
-                  <ma14:wrappingTextBoxFlag xmlns:ma14="http://schemas.microsoft.com/office/mac/drawingml/2011/main" xmlns:a14="http://schemas.microsoft.com/office/drawing/2010/main" xmlns:m="http://schemas.openxmlformats.org/officeDocument/2006/math" xmlns="" val="1"/>
+                  <ma14:wrappingTextBoxFlag xmlns="" xmlns:m="http://schemas.openxmlformats.org/officeDocument/2006/math" xmlns:a14="http://schemas.microsoft.com/office/drawing/2010/main" xmlns:ma14="http://schemas.microsoft.com/office/mac/drawingml/2011/main" val="1"/>
                 </a:ext>
               </a:extLst>
             </p:spPr>
@@ -12491,7 +12491,7 @@
               <a:effectLst/>
               <a:extLst>
                 <a:ext uri="{C572A759-6A51-4108-AA02-DFA0A04FC94B}">
-                  <ma14:wrappingTextBoxFlag xmlns:ma14="http://schemas.microsoft.com/office/mac/drawingml/2011/main" xmlns:a14="http://schemas.microsoft.com/office/drawing/2010/main" xmlns:m="http://schemas.openxmlformats.org/officeDocument/2006/math" xmlns="" val="1"/>
+                  <ma14:wrappingTextBoxFlag xmlns="" xmlns:m="http://schemas.openxmlformats.org/officeDocument/2006/math" xmlns:a14="http://schemas.microsoft.com/office/drawing/2010/main" xmlns:ma14="http://schemas.microsoft.com/office/mac/drawingml/2011/main" val="1"/>
                 </a:ext>
               </a:extLst>
             </p:spPr>
@@ -12543,7 +12543,7 @@
           </a:ln>
           <a:extLst>
             <a:ext uri="{C572A759-6A51-4108-AA02-DFA0A04FC94B}">
-              <ma14:wrappingTextBoxFlag xmlns:ma14="http://schemas.microsoft.com/office/mac/drawingml/2011/main" xmlns:a14="http://schemas.microsoft.com/office/drawing/2010/main" xmlns:m="http://schemas.openxmlformats.org/officeDocument/2006/math" xmlns="" val="1"/>
+              <ma14:wrappingTextBoxFlag xmlns="" xmlns:m="http://schemas.openxmlformats.org/officeDocument/2006/math" xmlns:a14="http://schemas.microsoft.com/office/drawing/2010/main" xmlns:ma14="http://schemas.microsoft.com/office/mac/drawingml/2011/main" val="1"/>
             </a:ext>
           </a:extLst>
         </p:spPr>
@@ -12621,7 +12621,7 @@
           </a:ln>
           <a:extLst>
             <a:ext uri="{C572A759-6A51-4108-AA02-DFA0A04FC94B}">
-              <ma14:wrappingTextBoxFlag xmlns:ma14="http://schemas.microsoft.com/office/mac/drawingml/2011/main" xmlns:a14="http://schemas.microsoft.com/office/drawing/2010/main" xmlns:m="http://schemas.openxmlformats.org/officeDocument/2006/math" xmlns="" val="1"/>
+              <ma14:wrappingTextBoxFlag xmlns="" xmlns:m="http://schemas.openxmlformats.org/officeDocument/2006/math" xmlns:a14="http://schemas.microsoft.com/office/drawing/2010/main" xmlns:ma14="http://schemas.microsoft.com/office/mac/drawingml/2011/main" val="1"/>
             </a:ext>
           </a:extLst>
         </p:spPr>
@@ -12711,7 +12711,7 @@
           </a:ln>
           <a:extLst>
             <a:ext uri="{C572A759-6A51-4108-AA02-DFA0A04FC94B}">
-              <ma14:wrappingTextBoxFlag xmlns:ma14="http://schemas.microsoft.com/office/mac/drawingml/2011/main" xmlns:a14="http://schemas.microsoft.com/office/drawing/2010/main" xmlns:m="http://schemas.openxmlformats.org/officeDocument/2006/math" xmlns="" val="1"/>
+              <ma14:wrappingTextBoxFlag xmlns="" xmlns:m="http://schemas.openxmlformats.org/officeDocument/2006/math" xmlns:a14="http://schemas.microsoft.com/office/drawing/2010/main" xmlns:ma14="http://schemas.microsoft.com/office/mac/drawingml/2011/main" val="1"/>
             </a:ext>
           </a:extLst>
         </p:spPr>
@@ -12823,7 +12823,7 @@
           </a:effectLst>
           <a:extLst>
             <a:ext uri="{C572A759-6A51-4108-AA02-DFA0A04FC94B}">
-              <ma14:wrappingTextBoxFlag xmlns:ma14="http://schemas.microsoft.com/office/mac/drawingml/2011/main" xmlns:a14="http://schemas.microsoft.com/office/drawing/2010/main" xmlns:m="http://schemas.openxmlformats.org/officeDocument/2006/math" xmlns="" val="1"/>
+              <ma14:wrappingTextBoxFlag xmlns="" xmlns:m="http://schemas.openxmlformats.org/officeDocument/2006/math" xmlns:a14="http://schemas.microsoft.com/office/drawing/2010/main" xmlns:ma14="http://schemas.microsoft.com/office/mac/drawingml/2011/main" val="1"/>
             </a:ext>
           </a:extLst>
         </p:spPr>
@@ -13761,7 +13761,7 @@
         <p:spPr>
           <a:xfrm>
             <a:off x="904186" y="6295352"/>
-            <a:ext cx="13571534" cy="5509689"/>
+            <a:ext cx="13571534" cy="13828334"/>
           </a:xfrm>
           <a:prstGeom prst="rect">
             <a:avLst/>
@@ -13779,7 +13779,7 @@
             </a:r>
             <a:r>
               <a:rPr lang="en-US" dirty="0" err="1"/>
-              <a:t>CoUG</a:t>
+              <a:t>Coug</a:t>
             </a:r>
             <a:r>
               <a:rPr lang="en-US" dirty="0"/>
@@ -13805,11 +13805,11 @@
             </a:r>
             <a:r>
               <a:rPr lang="en-US" dirty="0"/>
-              <a:t>. The dynamics naturally depend on several parameters of the vehicle, such as: (edit this list) weight, center of mass, center of buoyancy, drag, fin surface area, and maximum fin angle. Several of these are measurable or able to be calculated from measured quantities, but some of these parameters are unknown for the </a:t>
+              <a:t>. The dynamics naturally depend on several parameters of the vehicle, such as: weight, center of mass, center of buoyancy, drag, fin surface area, and maximum fin angle. Several of these are measurable or able to be calculated from measured quantities, but some of these parameters are unknown for the </a:t>
             </a:r>
             <a:r>
               <a:rPr lang="en-US" dirty="0" err="1"/>
-              <a:t>CoUG</a:t>
+              <a:t>Coug</a:t>
             </a:r>
             <a:r>
               <a:rPr lang="en-US" dirty="0"/>
@@ -13817,13 +13817,142 @@
             </a:r>
             <a:r>
               <a:rPr lang="en-US" dirty="0" err="1"/>
-              <a:t>CoUG</a:t>
+              <a:t>Coug</a:t>
             </a:r>
             <a:r>
               <a:rPr lang="en-US" dirty="0"/>
               <a:t>-UV and to validate the method in simulation. </a:t>
             </a:r>
-            <a:endParaRPr dirty="0"/>
+          </a:p>
+          <a:p>
+            <a:endParaRPr lang="en-US" dirty="0"/>
+          </a:p>
+          <a:p>
+            <a:r>
+              <a:rPr lang="en-US" sz="4000" u="sng" dirty="0" err="1"/>
+              <a:t>Coug</a:t>
+            </a:r>
+            <a:r>
+              <a:rPr lang="en-US" sz="4000" u="sng" dirty="0"/>
+              <a:t>-UV</a:t>
+            </a:r>
+            <a:r>
+              <a:rPr lang="en-US" sz="4000" dirty="0"/>
+              <a:t>: Torpedo-style underwater vehicle developed by BYU </a:t>
+            </a:r>
+            <a:r>
+              <a:rPr lang="en-US" sz="4000" dirty="0" err="1"/>
+              <a:t>FRoST</a:t>
+            </a:r>
+            <a:r>
+              <a:rPr lang="en-US" sz="4000" dirty="0"/>
+              <a:t> Lab</a:t>
+            </a:r>
+          </a:p>
+          <a:p>
+            <a:pPr marL="571500" indent="-571500">
+              <a:buFont typeface="Arial" panose="020B0604020202020204" pitchFamily="34" charset="0"/>
+              <a:buChar char="•"/>
+            </a:pPr>
+            <a:r>
+              <a:rPr lang="en-US" sz="4000" dirty="0"/>
+              <a:t>Designed to be cheap AUV for multi-agent SLAM research</a:t>
+            </a:r>
+          </a:p>
+          <a:p>
+            <a:pPr marL="571500" indent="-571500">
+              <a:buFont typeface="Arial" panose="020B0604020202020204" pitchFamily="34" charset="0"/>
+              <a:buChar char="•"/>
+            </a:pPr>
+            <a:r>
+              <a:rPr lang="en-US" sz="4000" dirty="0"/>
+              <a:t>Single rear thruster, three control fins</a:t>
+            </a:r>
+          </a:p>
+          <a:p>
+            <a:endParaRPr lang="en-US" sz="4000" dirty="0"/>
+          </a:p>
+          <a:p>
+            <a:r>
+              <a:rPr lang="en-US" sz="4000" u="sng" dirty="0"/>
+              <a:t>Dynamics</a:t>
+            </a:r>
+            <a:r>
+              <a:rPr lang="en-US" sz="4000" dirty="0"/>
+              <a:t>: Modeled by Thor Fossen in </a:t>
+            </a:r>
+            <a:r>
+              <a:rPr lang="en-US" sz="4000" i="1" dirty="0"/>
+              <a:t>Marine Craft Hydrodynamics and Control</a:t>
+            </a:r>
+          </a:p>
+          <a:p>
+            <a:pPr marL="571500" indent="-571500">
+              <a:buFont typeface="Arial" panose="020B0604020202020204" pitchFamily="34" charset="0"/>
+              <a:buChar char="•"/>
+            </a:pPr>
+            <a:r>
+              <a:rPr lang="en-US" sz="4000" dirty="0"/>
+              <a:t>44 parameters: mass, inertia, buoyancy, drag, damping, etc.</a:t>
+            </a:r>
+          </a:p>
+          <a:p>
+            <a:pPr marL="571500" indent="-571500">
+              <a:buFont typeface="Arial" panose="020B0604020202020204" pitchFamily="34" charset="0"/>
+              <a:buChar char="•"/>
+            </a:pPr>
+            <a:r>
+              <a:rPr lang="en-US" sz="4000" dirty="0"/>
+              <a:t>Only some parameters easily measurable</a:t>
+            </a:r>
+          </a:p>
+          <a:p>
+            <a:pPr marL="571500" indent="-571500">
+              <a:buFont typeface="Arial" panose="020B0604020202020204" pitchFamily="34" charset="0"/>
+              <a:buChar char="•"/>
+            </a:pPr>
+            <a:r>
+              <a:rPr lang="en-US" sz="4000"/>
+              <a:t>15 </a:t>
+            </a:r>
+            <a:r>
+              <a:rPr lang="en-US" sz="4000" dirty="0"/>
+              <a:t>parameters unknown, </a:t>
+            </a:r>
+          </a:p>
+          <a:p>
+            <a:pPr marL="571500" indent="-571500">
+              <a:buFont typeface="Arial" panose="020B0604020202020204" pitchFamily="34" charset="0"/>
+              <a:buChar char="•"/>
+            </a:pPr>
+            <a:endParaRPr lang="en-US" sz="4300" dirty="0"/>
+          </a:p>
+          <a:p>
+            <a:pPr marL="571500" indent="-571500">
+              <a:buFont typeface="Arial" panose="020B0604020202020204" pitchFamily="34" charset="0"/>
+              <a:buChar char="•"/>
+            </a:pPr>
+            <a:endParaRPr lang="en-US" sz="4300" dirty="0"/>
+          </a:p>
+          <a:p>
+            <a:pPr marL="571500" indent="-571500">
+              <a:buFont typeface="Arial" panose="020B0604020202020204" pitchFamily="34" charset="0"/>
+              <a:buChar char="•"/>
+            </a:pPr>
+            <a:endParaRPr lang="en-US" sz="4000" dirty="0"/>
+          </a:p>
+          <a:p>
+            <a:pPr marL="571500" indent="-571500">
+              <a:buFont typeface="Arial" panose="020B0604020202020204" pitchFamily="34" charset="0"/>
+              <a:buChar char="•"/>
+            </a:pPr>
+            <a:endParaRPr lang="en-US" sz="4000" dirty="0"/>
+          </a:p>
+          <a:p>
+            <a:endParaRPr lang="en-US" sz="4000" u="sng" dirty="0"/>
+          </a:p>
+          <a:p>
+            <a:endParaRPr sz="4000" dirty="0"/>
           </a:p>
         </p:txBody>
       </p:sp>
@@ -13843,7 +13972,9 @@
           </a:prstGeom>
         </p:spPr>
         <p:txBody>
-          <a:bodyPr/>
+          <a:bodyPr>
+            <a:noAutofit/>
+          </a:bodyPr>
           <a:lstStyle/>
           <a:p>
             <a:pPr algn="ctr">
@@ -13861,10 +13992,10 @@
               </a:defRPr>
             </a:pPr>
             <a:r>
-              <a:rPr lang="en-US" dirty="0"/>
+              <a:rPr lang="en-US" sz="6000" dirty="0"/>
               <a:t>Problem Statement</a:t>
             </a:r>
-            <a:endParaRPr dirty="0"/>
+            <a:endParaRPr sz="6000" dirty="0"/>
           </a:p>
         </p:txBody>
       </p:sp>
@@ -13879,6 +14010,10 @@
           </p:nvPr>
         </p:nvSpPr>
         <p:spPr>
+          <a:xfrm>
+            <a:off x="942079" y="21062832"/>
+            <a:ext cx="13592865" cy="861752"/>
+          </a:xfrm>
           <a:prstGeom prst="rect">
             <a:avLst/>
           </a:prstGeom>
@@ -13913,6 +14048,10 @@
           </p:nvPr>
         </p:nvSpPr>
         <p:spPr>
+          <a:xfrm>
+            <a:off x="961818" y="20216236"/>
+            <a:ext cx="13573126" cy="754046"/>
+          </a:xfrm>
           <a:prstGeom prst="rect">
             <a:avLst/>
           </a:prstGeom>
@@ -14006,7 +14145,7 @@
                 <a:sym typeface="Calibri"/>
               </a:defRPr>
             </a:pPr>
-            <a:endParaRPr/>
+            <a:endParaRPr dirty="0"/>
           </a:p>
         </p:txBody>
       </p:sp>
@@ -14357,7 +14496,7 @@
                 <a:sym typeface="Calibri"/>
               </a:defRPr>
             </a:pPr>
-            <a:endParaRPr/>
+            <a:endParaRPr dirty="0"/>
           </a:p>
         </p:txBody>
       </p:sp>
@@ -14384,7 +14523,7 @@
           <a:p>
             <a:r>
               <a:rPr lang="en-US" dirty="0" err="1"/>
-              <a:t>CoUG</a:t>
+              <a:t>Coug</a:t>
             </a:r>
             <a:r>
               <a:rPr lang="en-US" dirty="0"/>
@@ -14416,13 +14555,13 @@
               </a:ext>
             </a:extLst>
           </a:blip>
-          <a:srcRect t="37591" b="20785"/>
+          <a:srcRect t="37591" b="26289"/>
           <a:stretch/>
         </p:blipFill>
         <p:spPr bwMode="auto">
           <a:xfrm>
-            <a:off x="904185" y="12449686"/>
-            <a:ext cx="13571534" cy="4314897"/>
+            <a:off x="963410" y="25021179"/>
+            <a:ext cx="13571534" cy="3744322"/>
           </a:xfrm>
           <a:prstGeom prst="rect">
             <a:avLst/>

</xml_diff>

<commit_message>
Final version, everything done
</commit_message>
<xml_diff>
--- a/Poster.pptx
+++ b/Poster.pptx
@@ -13761,7 +13761,7 @@
         <p:spPr>
           <a:xfrm>
             <a:off x="904186" y="6295352"/>
-            <a:ext cx="13571534" cy="13828334"/>
+            <a:ext cx="13571534" cy="8117676"/>
           </a:xfrm>
           <a:prstGeom prst="rect">
             <a:avLst/>
@@ -13769,83 +13769,34 @@
         </p:spPr>
         <p:txBody>
           <a:bodyPr>
-            <a:normAutofit/>
+            <a:normAutofit fontScale="92500" lnSpcReduction="20000"/>
           </a:bodyPr>
           <a:lstStyle/>
           <a:p>
             <a:r>
-              <a:rPr lang="en-US" dirty="0"/>
-              <a:t>   The </a:t>
+              <a:rPr lang="en-US" sz="4300" b="1" u="sng" dirty="0" err="1"/>
+              <a:t>CougUV</a:t>
             </a:r>
             <a:r>
-              <a:rPr lang="en-US" dirty="0" err="1"/>
-              <a:t>Coug</a:t>
+              <a:rPr lang="en-US" sz="4300" dirty="0"/>
+              <a:t>: </a:t>
+            </a:r>
+          </a:p>
+          <a:p>
+            <a:pPr marL="571500" indent="-571500">
+              <a:buFont typeface="Arial" panose="020B0604020202020204" pitchFamily="34" charset="0"/>
+              <a:buChar char="•"/>
+            </a:pPr>
+            <a:r>
+              <a:rPr lang="en-US" sz="4300" dirty="0"/>
+              <a:t>Torpedo-style underwater vehicle developed by BYU </a:t>
             </a:r>
             <a:r>
-              <a:rPr lang="en-US" dirty="0"/>
-              <a:t>-UV is a torpedo-style underwater vehicle with a single rear thruster and three rear control fins, developed by the BYU </a:t>
-            </a:r>
-            <a:r>
-              <a:rPr lang="en-US" dirty="0" err="1"/>
+              <a:rPr lang="en-US" sz="4300" dirty="0" err="1"/>
               <a:t>FRoST</a:t>
             </a:r>
             <a:r>
-              <a:rPr lang="en-US" dirty="0"/>
-              <a:t> Lab and designed to be a cheap autonomous underwater vehicle for cooperative multi-agent localization and mapping algorithm testing.</a:t>
-            </a:r>
-          </a:p>
-          <a:p>
-            <a:r>
-              <a:rPr lang="en-US" dirty="0"/>
-              <a:t>   A mathematical model for the vehicle dynamics of torpedo vehicles has been given by Thor Fossen in </a:t>
-            </a:r>
-            <a:r>
-              <a:rPr lang="en-US" i="1" dirty="0"/>
-              <a:t>Marine Craft Hydrodynamics and Control</a:t>
-            </a:r>
-            <a:r>
-              <a:rPr lang="en-US" dirty="0"/>
-              <a:t>. The dynamics naturally depend on several parameters of the vehicle, such as: weight, center of mass, center of buoyancy, drag, fin surface area, and maximum fin angle. Several of these are measurable or able to be calculated from measured quantities, but some of these parameters are unknown for the </a:t>
-            </a:r>
-            <a:r>
-              <a:rPr lang="en-US" dirty="0" err="1"/>
-              <a:t>Coug</a:t>
-            </a:r>
-            <a:r>
-              <a:rPr lang="en-US" dirty="0"/>
-              <a:t>-UV. Our goal is to develop a system identification method to find the true dynamic parameters of the </a:t>
-            </a:r>
-            <a:r>
-              <a:rPr lang="en-US" dirty="0" err="1"/>
-              <a:t>Coug</a:t>
-            </a:r>
-            <a:r>
-              <a:rPr lang="en-US" dirty="0"/>
-              <a:t>-UV and to validate the method in simulation. </a:t>
-            </a:r>
-          </a:p>
-          <a:p>
-            <a:endParaRPr lang="en-US" dirty="0"/>
-          </a:p>
-          <a:p>
-            <a:r>
-              <a:rPr lang="en-US" sz="4000" u="sng" dirty="0" err="1"/>
-              <a:t>Coug</a:t>
-            </a:r>
-            <a:r>
-              <a:rPr lang="en-US" sz="4000" u="sng" dirty="0"/>
-              <a:t>-UV</a:t>
-            </a:r>
-            <a:r>
-              <a:rPr lang="en-US" sz="4000" dirty="0"/>
-              <a:t>: Torpedo-style underwater vehicle developed by BYU </a:t>
-            </a:r>
-            <a:r>
-              <a:rPr lang="en-US" sz="4000" dirty="0" err="1"/>
-              <a:t>FRoST</a:t>
-            </a:r>
-            <a:r>
-              <a:rPr lang="en-US" sz="4000" dirty="0"/>
+              <a:rPr lang="en-US" sz="4300" dirty="0"/>
               <a:t> Lab</a:t>
             </a:r>
           </a:p>
@@ -13855,8 +13806,8 @@
               <a:buChar char="•"/>
             </a:pPr>
             <a:r>
-              <a:rPr lang="en-US" sz="4000" dirty="0"/>
-              <a:t>Designed to be cheap AUV for multi-agent SLAM research</a:t>
+              <a:rPr lang="en-US" sz="4300" dirty="0"/>
+              <a:t>Cheap AUV for multi-agent SLAM research</a:t>
             </a:r>
           </a:p>
           <a:p>
@@ -13865,25 +13816,8 @@
               <a:buChar char="•"/>
             </a:pPr>
             <a:r>
-              <a:rPr lang="en-US" sz="4000" dirty="0"/>
+              <a:rPr lang="en-US" sz="4300" dirty="0"/>
               <a:t>Single rear thruster, three control fins</a:t>
-            </a:r>
-          </a:p>
-          <a:p>
-            <a:endParaRPr lang="en-US" sz="4000" dirty="0"/>
-          </a:p>
-          <a:p>
-            <a:r>
-              <a:rPr lang="en-US" sz="4000" u="sng" dirty="0"/>
-              <a:t>Dynamics</a:t>
-            </a:r>
-            <a:r>
-              <a:rPr lang="en-US" sz="4000" dirty="0"/>
-              <a:t>: Modeled by Thor Fossen in </a:t>
-            </a:r>
-            <a:r>
-              <a:rPr lang="en-US" sz="4000" i="1" dirty="0"/>
-              <a:t>Marine Craft Hydrodynamics and Control</a:t>
             </a:r>
           </a:p>
           <a:p>
@@ -13892,8 +13826,30 @@
               <a:buChar char="•"/>
             </a:pPr>
             <a:r>
-              <a:rPr lang="en-US" sz="4000" dirty="0"/>
-              <a:t>44 parameters: mass, inertia, buoyancy, drag, damping, etc.</a:t>
+              <a:rPr lang="en-US" sz="4300" dirty="0"/>
+              <a:t>Dynamics modeled by Thor Fossen in </a:t>
+            </a:r>
+            <a:r>
+              <a:rPr lang="en-US" sz="4300" i="1" dirty="0"/>
+              <a:t>Marine Craft Hydrodynamics and Control</a:t>
+            </a:r>
+            <a:endParaRPr lang="en-US" sz="4300" dirty="0"/>
+          </a:p>
+          <a:p>
+            <a:endParaRPr lang="en-US" sz="4300" dirty="0"/>
+          </a:p>
+          <a:p>
+            <a:r>
+              <a:rPr lang="en-US" sz="4300" b="1" u="sng" dirty="0"/>
+              <a:t>Model </a:t>
+            </a:r>
+            <a:r>
+              <a:rPr lang="en-US" sz="4300" b="1" u="sng" dirty="0" err="1"/>
+              <a:t>Paramenters</a:t>
+            </a:r>
+            <a:r>
+              <a:rPr lang="en-US" sz="4300" dirty="0"/>
+              <a:t>: 39 total</a:t>
             </a:r>
           </a:p>
           <a:p>
@@ -13902,8 +13858,31 @@
               <a:buChar char="•"/>
             </a:pPr>
             <a:r>
-              <a:rPr lang="en-US" sz="4000" dirty="0"/>
-              <a:t>Only some parameters easily measurable</a:t>
+              <a:rPr lang="en-US" sz="4300" dirty="0"/>
+              <a:t>Mass, inertia, buoyancy, drag, damping, thrust </a:t>
+            </a:r>
+            <a:r>
+              <a:rPr lang="en-US" sz="4300" dirty="0" err="1"/>
+              <a:t>coeff</a:t>
+            </a:r>
+            <a:r>
+              <a:rPr lang="en-US" sz="4300" dirty="0"/>
+              <a:t>., </a:t>
+            </a:r>
+            <a:r>
+              <a:rPr lang="en-US" sz="4300" dirty="0" err="1"/>
+              <a:t>etc</a:t>
+            </a:r>
+            <a:endParaRPr lang="en-US" sz="4300" dirty="0"/>
+          </a:p>
+          <a:p>
+            <a:pPr marL="571500" indent="-571500">
+              <a:buFont typeface="Arial" panose="020B0604020202020204" pitchFamily="34" charset="0"/>
+              <a:buChar char="•"/>
+            </a:pPr>
+            <a:r>
+              <a:rPr lang="en-US" sz="4300" dirty="0"/>
+              <a:t>13 easily measured or obtained from specs</a:t>
             </a:r>
           </a:p>
           <a:p>
@@ -13912,12 +13891,8 @@
               <a:buChar char="•"/>
             </a:pPr>
             <a:r>
-              <a:rPr lang="en-US" sz="4000"/>
-              <a:t>15 </a:t>
-            </a:r>
-            <a:r>
-              <a:rPr lang="en-US" sz="4000" dirty="0"/>
-              <a:t>parameters unknown, </a:t>
+              <a:rPr lang="en-US" sz="4300" dirty="0"/>
+              <a:t>12 known approximately or by assumption</a:t>
             </a:r>
           </a:p>
           <a:p>
@@ -13925,33 +13900,10 @@
               <a:buFont typeface="Arial" panose="020B0604020202020204" pitchFamily="34" charset="0"/>
               <a:buChar char="•"/>
             </a:pPr>
-            <a:endParaRPr lang="en-US" sz="4300" dirty="0"/>
-          </a:p>
-          <a:p>
-            <a:pPr marL="571500" indent="-571500">
-              <a:buFont typeface="Arial" panose="020B0604020202020204" pitchFamily="34" charset="0"/>
-              <a:buChar char="•"/>
-            </a:pPr>
-            <a:endParaRPr lang="en-US" sz="4300" dirty="0"/>
-          </a:p>
-          <a:p>
-            <a:pPr marL="571500" indent="-571500">
-              <a:buFont typeface="Arial" panose="020B0604020202020204" pitchFamily="34" charset="0"/>
-              <a:buChar char="•"/>
-            </a:pPr>
-            <a:endParaRPr lang="en-US" sz="4000" dirty="0"/>
-          </a:p>
-          <a:p>
-            <a:pPr marL="571500" indent="-571500">
-              <a:buFont typeface="Arial" panose="020B0604020202020204" pitchFamily="34" charset="0"/>
-              <a:buChar char="•"/>
-            </a:pPr>
-            <a:endParaRPr lang="en-US" sz="4000" dirty="0"/>
-          </a:p>
-          <a:p>
-            <a:endParaRPr lang="en-US" sz="4000" u="sng" dirty="0"/>
-          </a:p>
-          <a:p>
+            <a:r>
+              <a:rPr lang="en-US" sz="4300" dirty="0"/>
+              <a:t>14 completely unknown</a:t>
+            </a:r>
             <a:endParaRPr sz="4000" dirty="0"/>
           </a:p>
         </p:txBody>
@@ -14011,18 +13963,20 @@
         </p:nvSpPr>
         <p:spPr>
           <a:xfrm>
-            <a:off x="942079" y="21062832"/>
-            <a:ext cx="13592865" cy="861752"/>
+            <a:off x="893520" y="18788581"/>
+            <a:ext cx="13592865" cy="1717702"/>
           </a:xfrm>
           <a:prstGeom prst="rect">
             <a:avLst/>
           </a:prstGeom>
         </p:spPr>
         <p:txBody>
-          <a:bodyPr/>
+          <a:bodyPr>
+            <a:noAutofit/>
+          </a:bodyPr>
           <a:lstStyle/>
           <a:p>
-            <a:pPr>
+            <a:pPr algn="ctr">
               <a:defRPr sz="2600">
                 <a:solidFill>
                   <a:srgbClr val="2C3F71"/>
@@ -14033,7 +13987,19 @@
                 <a:sym typeface="Times New Roman"/>
               </a:defRPr>
             </a:pPr>
-            <a:endParaRPr dirty="0"/>
+            <a:r>
+              <a:rPr lang="en-US" sz="4000" dirty="0"/>
+              <a:t>Formulate and solve a System Identification problem </a:t>
+            </a:r>
+            <a:r>
+              <a:rPr lang="en-US" sz="4000" i="1" dirty="0"/>
+              <a:t>in simulation </a:t>
+            </a:r>
+            <a:r>
+              <a:rPr lang="en-US" sz="4000" dirty="0"/>
+              <a:t>to identify the unknown and approximate parameters</a:t>
+            </a:r>
+            <a:endParaRPr lang="en-US" sz="4000" u="sng" dirty="0"/>
           </a:p>
         </p:txBody>
       </p:sp>
@@ -14049,7 +14015,7 @@
         </p:nvSpPr>
         <p:spPr>
           <a:xfrm>
-            <a:off x="961818" y="20216236"/>
+            <a:off x="932207" y="18079056"/>
             <a:ext cx="13573126" cy="754046"/>
           </a:xfrm>
           <a:prstGeom prst="rect">
@@ -14057,7 +14023,9 @@
           </a:prstGeom>
         </p:spPr>
         <p:txBody>
-          <a:bodyPr/>
+          <a:bodyPr>
+            <a:noAutofit/>
+          </a:bodyPr>
           <a:lstStyle/>
           <a:p>
             <a:pPr algn="ctr">
@@ -14074,78 +14042,11 @@
                 <a:sym typeface="Calibri"/>
               </a:defRPr>
             </a:pPr>
-            <a:endParaRPr dirty="0"/>
-          </a:p>
-        </p:txBody>
-      </p:sp>
-      <p:sp>
-        <p:nvSpPr>
-          <p:cNvPr id="214" name="Text Placeholder 4"/>
-          <p:cNvSpPr>
-            <a:spLocks noGrp="1"/>
-          </p:cNvSpPr>
-          <p:nvPr>
-            <p:ph type="body" idx="16"/>
-          </p:nvPr>
-        </p:nvSpPr>
-        <p:spPr>
-          <a:prstGeom prst="rect">
-            <a:avLst/>
-          </a:prstGeom>
-        </p:spPr>
-        <p:txBody>
-          <a:bodyPr/>
-          <a:lstStyle/>
-          <a:p>
-            <a:pPr>
-              <a:defRPr sz="2600">
-                <a:solidFill>
-                  <a:srgbClr val="2C3F71"/>
-                </a:solidFill>
-                <a:latin typeface="Times New Roman"/>
-                <a:ea typeface="Times New Roman"/>
-                <a:cs typeface="Times New Roman"/>
-                <a:sym typeface="Times New Roman"/>
-              </a:defRPr>
-            </a:pPr>
-            <a:endParaRPr/>
-          </a:p>
-        </p:txBody>
-      </p:sp>
-      <p:sp>
-        <p:nvSpPr>
-          <p:cNvPr id="215" name="Text Placeholder 5"/>
-          <p:cNvSpPr>
-            <a:spLocks noGrp="1"/>
-          </p:cNvSpPr>
-          <p:nvPr>
-            <p:ph type="body" idx="17"/>
-          </p:nvPr>
-        </p:nvSpPr>
-        <p:spPr>
-          <a:prstGeom prst="rect">
-            <a:avLst/>
-          </a:prstGeom>
-        </p:spPr>
-        <p:txBody>
-          <a:bodyPr/>
-          <a:lstStyle/>
-          <a:p>
-            <a:pPr algn="ctr">
-              <a:spcBef>
-                <a:spcPts val="800"/>
-              </a:spcBef>
-              <a:defRPr sz="3700" b="1" u="sng">
-                <a:solidFill>
-                  <a:srgbClr val="2C3F71"/>
-                </a:solidFill>
-                <a:latin typeface="+mj-lt"/>
-                <a:ea typeface="+mj-ea"/>
-                <a:cs typeface="+mj-cs"/>
-                <a:sym typeface="Calibri"/>
-              </a:defRPr>
-            </a:pPr>
-            <a:endParaRPr dirty="0"/>
+            <a:r>
+              <a:rPr lang="en-US" sz="6000" dirty="0"/>
+              <a:t>Objective</a:t>
+            </a:r>
+            <a:endParaRPr sz="6000" dirty="0"/>
           </a:p>
         </p:txBody>
       </p:sp>
@@ -14160,12 +14061,18 @@
           </p:nvPr>
         </p:nvSpPr>
         <p:spPr>
+          <a:xfrm>
+            <a:off x="15162215" y="6295351"/>
+            <a:ext cx="13571535" cy="5896649"/>
+          </a:xfrm>
           <a:prstGeom prst="rect">
             <a:avLst/>
           </a:prstGeom>
         </p:spPr>
         <p:txBody>
-          <a:bodyPr/>
+          <a:bodyPr>
+            <a:normAutofit/>
+          </a:bodyPr>
           <a:lstStyle/>
           <a:p>
             <a:pPr>
@@ -14179,7 +14086,99 @@
                 <a:sym typeface="Times New Roman"/>
               </a:defRPr>
             </a:pPr>
-            <a:endParaRPr dirty="0"/>
+            <a:r>
+              <a:rPr lang="en-US" sz="4000" b="1" u="sng" dirty="0"/>
+              <a:t>Successfully Estimated 27 Parameters</a:t>
+            </a:r>
+            <a:endParaRPr lang="en-US" sz="4000" u="sng" dirty="0"/>
+          </a:p>
+          <a:p>
+            <a:pPr marL="457200" indent="-457200">
+              <a:buFont typeface="Arial" panose="020B0604020202020204" pitchFamily="34" charset="0"/>
+              <a:buChar char="•"/>
+              <a:defRPr sz="2600">
+                <a:solidFill>
+                  <a:srgbClr val="2C3F71"/>
+                </a:solidFill>
+                <a:latin typeface="Times New Roman"/>
+                <a:ea typeface="Times New Roman"/>
+                <a:cs typeface="Times New Roman"/>
+                <a:sym typeface="Times New Roman"/>
+              </a:defRPr>
+            </a:pPr>
+            <a:r>
+              <a:rPr lang="en-US" sz="4000" dirty="0"/>
+              <a:t>All 14 of the unknown params</a:t>
+            </a:r>
+          </a:p>
+          <a:p>
+            <a:pPr marL="457200" indent="-457200">
+              <a:buFont typeface="Arial" panose="020B0604020202020204" pitchFamily="34" charset="0"/>
+              <a:buChar char="•"/>
+              <a:defRPr sz="2600">
+                <a:solidFill>
+                  <a:srgbClr val="2C3F71"/>
+                </a:solidFill>
+                <a:latin typeface="Times New Roman"/>
+                <a:ea typeface="Times New Roman"/>
+                <a:cs typeface="Times New Roman"/>
+                <a:sym typeface="Times New Roman"/>
+              </a:defRPr>
+            </a:pPr>
+            <a:r>
+              <a:rPr lang="en-US" sz="4000" dirty="0"/>
+              <a:t>All 12 of the approximated params</a:t>
+            </a:r>
+          </a:p>
+          <a:p>
+            <a:pPr marL="457200" indent="-457200">
+              <a:buFont typeface="Arial" panose="020B0604020202020204" pitchFamily="34" charset="0"/>
+              <a:buChar char="•"/>
+              <a:defRPr sz="2600">
+                <a:solidFill>
+                  <a:srgbClr val="2C3F71"/>
+                </a:solidFill>
+                <a:latin typeface="Times New Roman"/>
+                <a:ea typeface="Times New Roman"/>
+                <a:cs typeface="Times New Roman"/>
+                <a:sym typeface="Times New Roman"/>
+              </a:defRPr>
+            </a:pPr>
+            <a:r>
+              <a:rPr lang="en-US" sz="4000" dirty="0"/>
+              <a:t>1 of the measurable params</a:t>
+            </a:r>
+          </a:p>
+          <a:p>
+            <a:pPr>
+              <a:defRPr sz="2600">
+                <a:solidFill>
+                  <a:srgbClr val="2C3F71"/>
+                </a:solidFill>
+                <a:latin typeface="Times New Roman"/>
+                <a:ea typeface="Times New Roman"/>
+                <a:cs typeface="Times New Roman"/>
+                <a:sym typeface="Times New Roman"/>
+              </a:defRPr>
+            </a:pPr>
+            <a:endParaRPr lang="en-US" sz="4000" dirty="0"/>
+          </a:p>
+          <a:p>
+            <a:pPr algn="ctr">
+              <a:defRPr sz="2600">
+                <a:solidFill>
+                  <a:srgbClr val="2C3F71"/>
+                </a:solidFill>
+                <a:latin typeface="Times New Roman"/>
+                <a:ea typeface="Times New Roman"/>
+                <a:cs typeface="Times New Roman"/>
+                <a:sym typeface="Times New Roman"/>
+              </a:defRPr>
+            </a:pPr>
+            <a:r>
+              <a:rPr lang="en-US" sz="4000" dirty="0"/>
+              <a:t>Pose Trajectory using Estimated Parameters: </a:t>
+            </a:r>
           </a:p>
         </p:txBody>
       </p:sp>
@@ -14199,7 +14198,9 @@
           </a:prstGeom>
         </p:spPr>
         <p:txBody>
-          <a:bodyPr/>
+          <a:bodyPr>
+            <a:noAutofit/>
+          </a:bodyPr>
           <a:lstStyle/>
           <a:p>
             <a:pPr algn="ctr">
@@ -14216,7 +14217,11 @@
                 <a:sym typeface="Calibri"/>
               </a:defRPr>
             </a:pPr>
-            <a:endParaRPr/>
+            <a:r>
+              <a:rPr lang="en-US" sz="6000" dirty="0"/>
+              <a:t>Results</a:t>
+            </a:r>
+            <a:endParaRPr sz="6000" dirty="0"/>
           </a:p>
         </p:txBody>
       </p:sp>
@@ -14236,7 +14241,9 @@
           </a:prstGeom>
         </p:spPr>
         <p:txBody>
-          <a:bodyPr/>
+          <a:bodyPr>
+            <a:noAutofit/>
+          </a:bodyPr>
           <a:lstStyle/>
           <a:p>
             <a:pPr algn="ctr">
@@ -14253,7 +14260,11 @@
                 <a:sym typeface="Calibri"/>
               </a:defRPr>
             </a:pPr>
-            <a:endParaRPr/>
+            <a:r>
+              <a:rPr lang="en-US" sz="6000" dirty="0"/>
+              <a:t>Discussion</a:t>
+            </a:r>
+            <a:endParaRPr sz="6000" dirty="0"/>
           </a:p>
         </p:txBody>
       </p:sp>
@@ -14273,7 +14284,9 @@
           </a:prstGeom>
         </p:spPr>
         <p:txBody>
-          <a:bodyPr/>
+          <a:bodyPr>
+            <a:noAutofit/>
+          </a:bodyPr>
           <a:lstStyle/>
           <a:p>
             <a:pPr>
@@ -14287,7 +14300,182 @@
                 <a:sym typeface="Times New Roman"/>
               </a:defRPr>
             </a:pPr>
-            <a:endParaRPr/>
+            <a:r>
+              <a:rPr lang="en-US" sz="4000" b="1" u="sng" dirty="0"/>
+              <a:t>Identifiability</a:t>
+            </a:r>
+            <a:r>
+              <a:rPr lang="en-US" sz="4000" b="1" dirty="0"/>
+              <a:t>:</a:t>
+            </a:r>
+          </a:p>
+          <a:p>
+            <a:pPr marL="571500" indent="-571500">
+              <a:buFont typeface="Arial" panose="020B0604020202020204" pitchFamily="34" charset="0"/>
+              <a:buChar char="•"/>
+              <a:defRPr sz="2600">
+                <a:solidFill>
+                  <a:srgbClr val="2C3F71"/>
+                </a:solidFill>
+                <a:latin typeface="Times New Roman"/>
+                <a:ea typeface="Times New Roman"/>
+                <a:cs typeface="Times New Roman"/>
+                <a:sym typeface="Times New Roman"/>
+              </a:defRPr>
+            </a:pPr>
+            <a:r>
+              <a:rPr lang="en-US" sz="4000" dirty="0"/>
+              <a:t>Highly nonlinear system makes analytic identifiability analysis difficult</a:t>
+            </a:r>
+          </a:p>
+          <a:p>
+            <a:pPr marL="2057325" lvl="1" indent="-571500">
+              <a:buFont typeface="Arial" panose="020B0604020202020204" pitchFamily="34" charset="0"/>
+              <a:buChar char="•"/>
+              <a:defRPr sz="2600">
+                <a:solidFill>
+                  <a:srgbClr val="2C3F71"/>
+                </a:solidFill>
+                <a:latin typeface="Times New Roman"/>
+                <a:ea typeface="Times New Roman"/>
+                <a:cs typeface="Times New Roman"/>
+                <a:sym typeface="Times New Roman"/>
+              </a:defRPr>
+            </a:pPr>
+            <a:r>
+              <a:rPr lang="en-US" sz="4000" dirty="0"/>
+              <a:t>Iterative, guess-and-check approach </a:t>
+            </a:r>
+          </a:p>
+          <a:p>
+            <a:pPr marL="571500" indent="-571500">
+              <a:buFont typeface="Arial" panose="020B0604020202020204" pitchFamily="34" charset="0"/>
+              <a:buChar char="•"/>
+              <a:defRPr sz="2600">
+                <a:solidFill>
+                  <a:srgbClr val="2C3F71"/>
+                </a:solidFill>
+                <a:latin typeface="Times New Roman"/>
+                <a:ea typeface="Times New Roman"/>
+                <a:cs typeface="Times New Roman"/>
+                <a:sym typeface="Times New Roman"/>
+              </a:defRPr>
+            </a:pPr>
+            <a:r>
+              <a:rPr lang="en-US" sz="4000" dirty="0"/>
+              <a:t>Some parameters are very sensitive to initialization</a:t>
+            </a:r>
+          </a:p>
+          <a:p>
+            <a:pPr marL="2057325" lvl="1" indent="-571500">
+              <a:buFont typeface="Arial" panose="020B0604020202020204" pitchFamily="34" charset="0"/>
+              <a:buChar char="•"/>
+              <a:defRPr sz="2600">
+                <a:solidFill>
+                  <a:srgbClr val="2C3F71"/>
+                </a:solidFill>
+                <a:latin typeface="Times New Roman"/>
+                <a:ea typeface="Times New Roman"/>
+                <a:cs typeface="Times New Roman"/>
+                <a:sym typeface="Times New Roman"/>
+              </a:defRPr>
+            </a:pPr>
+            <a:r>
+              <a:rPr lang="en-US" sz="4000" dirty="0"/>
+              <a:t>Mostly “approximate” parameters, can drop if needed when running on real data</a:t>
+            </a:r>
+          </a:p>
+          <a:p>
+            <a:pPr marL="571500" indent="-571500">
+              <a:buFont typeface="Arial" panose="020B0604020202020204" pitchFamily="34" charset="0"/>
+              <a:buChar char="•"/>
+              <a:defRPr sz="2600">
+                <a:solidFill>
+                  <a:srgbClr val="2C3F71"/>
+                </a:solidFill>
+                <a:latin typeface="Times New Roman"/>
+                <a:ea typeface="Times New Roman"/>
+                <a:cs typeface="Times New Roman"/>
+                <a:sym typeface="Times New Roman"/>
+              </a:defRPr>
+            </a:pPr>
+            <a:r>
+              <a:rPr lang="en-US" sz="4000" dirty="0"/>
+              <a:t>Desirable to also estimate measurable parameters</a:t>
+            </a:r>
+          </a:p>
+          <a:p>
+            <a:pPr marL="2057325" lvl="1" indent="-571500">
+              <a:buFont typeface="Arial" panose="020B0604020202020204" pitchFamily="34" charset="0"/>
+              <a:buChar char="•"/>
+              <a:defRPr sz="2600">
+                <a:solidFill>
+                  <a:srgbClr val="2C3F71"/>
+                </a:solidFill>
+                <a:latin typeface="Times New Roman"/>
+                <a:ea typeface="Times New Roman"/>
+                <a:cs typeface="Times New Roman"/>
+                <a:sym typeface="Times New Roman"/>
+              </a:defRPr>
+            </a:pPr>
+            <a:r>
+              <a:rPr lang="en-US" sz="4000" dirty="0"/>
+              <a:t>Derivation of model makes simplifying assumptions that may make the “optimal” values different from measured values</a:t>
+            </a:r>
+          </a:p>
+          <a:p>
+            <a:pPr marL="2057325" lvl="1" indent="-571500">
+              <a:buFont typeface="Arial" panose="020B0604020202020204" pitchFamily="34" charset="0"/>
+              <a:buChar char="•"/>
+              <a:defRPr sz="2600">
+                <a:solidFill>
+                  <a:srgbClr val="2C3F71"/>
+                </a:solidFill>
+                <a:latin typeface="Times New Roman"/>
+                <a:ea typeface="Times New Roman"/>
+                <a:cs typeface="Times New Roman"/>
+                <a:sym typeface="Times New Roman"/>
+              </a:defRPr>
+            </a:pPr>
+            <a:r>
+              <a:rPr lang="en-US" sz="4000" dirty="0"/>
+              <a:t>Possibly unidentifiable: requires further analysis</a:t>
+            </a:r>
+          </a:p>
+          <a:p>
+            <a:pPr marL="571500" indent="-571500">
+              <a:buFont typeface="Arial" panose="020B0604020202020204" pitchFamily="34" charset="0"/>
+              <a:buChar char="•"/>
+              <a:defRPr sz="2600">
+                <a:solidFill>
+                  <a:srgbClr val="2C3F71"/>
+                </a:solidFill>
+                <a:latin typeface="Times New Roman"/>
+                <a:ea typeface="Times New Roman"/>
+                <a:cs typeface="Times New Roman"/>
+                <a:sym typeface="Times New Roman"/>
+              </a:defRPr>
+            </a:pPr>
+            <a:r>
+              <a:rPr lang="en-US" sz="4000" dirty="0"/>
+              <a:t>Real vehicle won’t estimate nearly as well (model not exact)</a:t>
+            </a:r>
+          </a:p>
+          <a:p>
+            <a:pPr marL="2057325" lvl="1" indent="-571500">
+              <a:buFont typeface="Arial" panose="020B0604020202020204" pitchFamily="34" charset="0"/>
+              <a:buChar char="•"/>
+              <a:defRPr sz="2600">
+                <a:solidFill>
+                  <a:srgbClr val="2C3F71"/>
+                </a:solidFill>
+                <a:latin typeface="Times New Roman"/>
+                <a:ea typeface="Times New Roman"/>
+                <a:cs typeface="Times New Roman"/>
+                <a:sym typeface="Times New Roman"/>
+              </a:defRPr>
+            </a:pPr>
+            <a:endParaRPr lang="en-US" sz="4000" dirty="0"/>
           </a:p>
         </p:txBody>
       </p:sp>
@@ -14302,12 +14490,18 @@
           </p:nvPr>
         </p:nvSpPr>
         <p:spPr>
+          <a:xfrm>
+            <a:off x="29391243" y="15672812"/>
+            <a:ext cx="13576030" cy="754046"/>
+          </a:xfrm>
           <a:prstGeom prst="rect">
             <a:avLst/>
           </a:prstGeom>
         </p:spPr>
         <p:txBody>
-          <a:bodyPr/>
+          <a:bodyPr>
+            <a:noAutofit/>
+          </a:bodyPr>
           <a:lstStyle/>
           <a:p>
             <a:pPr algn="ctr">
@@ -14324,7 +14518,11 @@
                 <a:sym typeface="Calibri"/>
               </a:defRPr>
             </a:pPr>
-            <a:endParaRPr/>
+            <a:r>
+              <a:rPr lang="en-US" sz="6000" dirty="0"/>
+              <a:t>Future Work</a:t>
+            </a:r>
+            <a:endParaRPr sz="6000" dirty="0"/>
           </a:p>
         </p:txBody>
       </p:sp>
@@ -14339,12 +14537,18 @@
           </p:nvPr>
         </p:nvSpPr>
         <p:spPr>
+          <a:xfrm>
+            <a:off x="29377931" y="16459200"/>
+            <a:ext cx="13581062" cy="9604571"/>
+          </a:xfrm>
           <a:prstGeom prst="rect">
             <a:avLst/>
           </a:prstGeom>
         </p:spPr>
         <p:txBody>
-          <a:bodyPr/>
+          <a:bodyPr>
+            <a:noAutofit/>
+          </a:bodyPr>
           <a:lstStyle/>
           <a:p>
             <a:pPr>
@@ -14358,7 +14562,209 @@
                 <a:sym typeface="Times New Roman"/>
               </a:defRPr>
             </a:pPr>
-            <a:endParaRPr/>
+            <a:r>
+              <a:rPr lang="en-US" sz="4000" b="1" u="sng" dirty="0"/>
+              <a:t>Improve Performance</a:t>
+            </a:r>
+            <a:endParaRPr lang="en-US" sz="4000" dirty="0"/>
+          </a:p>
+          <a:p>
+            <a:pPr marL="571500" indent="-571500">
+              <a:buFont typeface="Arial" panose="020B0604020202020204" pitchFamily="34" charset="0"/>
+              <a:buChar char="•"/>
+              <a:defRPr sz="2600">
+                <a:solidFill>
+                  <a:srgbClr val="2C3F71"/>
+                </a:solidFill>
+                <a:latin typeface="Times New Roman"/>
+                <a:ea typeface="Times New Roman"/>
+                <a:cs typeface="Times New Roman"/>
+                <a:sym typeface="Times New Roman"/>
+              </a:defRPr>
+            </a:pPr>
+            <a:r>
+              <a:rPr lang="en-US" sz="4000" dirty="0"/>
+              <a:t>Detailed stability and identifiability analysis to find all unidentifiable parameter combinations</a:t>
+            </a:r>
+          </a:p>
+          <a:p>
+            <a:pPr marL="571500" indent="-571500">
+              <a:buFont typeface="Arial" panose="020B0604020202020204" pitchFamily="34" charset="0"/>
+              <a:buChar char="•"/>
+              <a:defRPr sz="2600">
+                <a:solidFill>
+                  <a:srgbClr val="2C3F71"/>
+                </a:solidFill>
+                <a:latin typeface="Times New Roman"/>
+                <a:ea typeface="Times New Roman"/>
+                <a:cs typeface="Times New Roman"/>
+                <a:sym typeface="Times New Roman"/>
+              </a:defRPr>
+            </a:pPr>
+            <a:r>
+              <a:rPr lang="en-US" sz="4000" dirty="0"/>
+              <a:t>Design better sequence of inputs to isolate parameters and excite modes </a:t>
+            </a:r>
+          </a:p>
+          <a:p>
+            <a:pPr marL="571500" indent="-571500">
+              <a:buFont typeface="Arial" panose="020B0604020202020204" pitchFamily="34" charset="0"/>
+              <a:buChar char="•"/>
+              <a:defRPr sz="2600">
+                <a:solidFill>
+                  <a:srgbClr val="2C3F71"/>
+                </a:solidFill>
+                <a:latin typeface="Times New Roman"/>
+                <a:ea typeface="Times New Roman"/>
+                <a:cs typeface="Times New Roman"/>
+                <a:sym typeface="Times New Roman"/>
+              </a:defRPr>
+            </a:pPr>
+            <a:r>
+              <a:rPr lang="en-US" sz="4000" dirty="0"/>
+              <a:t>Analysis to better identify regions of attraction and sensitive parameters</a:t>
+            </a:r>
+          </a:p>
+          <a:p>
+            <a:pPr marL="571500" indent="-571500">
+              <a:buFont typeface="Arial" panose="020B0604020202020204" pitchFamily="34" charset="0"/>
+              <a:buChar char="•"/>
+              <a:defRPr sz="2600">
+                <a:solidFill>
+                  <a:srgbClr val="2C3F71"/>
+                </a:solidFill>
+                <a:latin typeface="Times New Roman"/>
+                <a:ea typeface="Times New Roman"/>
+                <a:cs typeface="Times New Roman"/>
+                <a:sym typeface="Times New Roman"/>
+              </a:defRPr>
+            </a:pPr>
+            <a:endParaRPr lang="en-US" sz="4000" dirty="0"/>
+          </a:p>
+          <a:p>
+            <a:pPr>
+              <a:defRPr sz="2600">
+                <a:solidFill>
+                  <a:srgbClr val="2C3F71"/>
+                </a:solidFill>
+                <a:latin typeface="Times New Roman"/>
+                <a:ea typeface="Times New Roman"/>
+                <a:cs typeface="Times New Roman"/>
+                <a:sym typeface="Times New Roman"/>
+              </a:defRPr>
+            </a:pPr>
+            <a:r>
+              <a:rPr lang="en-US" sz="4000" b="1" u="sng" dirty="0"/>
+              <a:t>Field Testing</a:t>
+            </a:r>
+          </a:p>
+          <a:p>
+            <a:pPr marL="571500" indent="-571500">
+              <a:buFont typeface="Arial" panose="020B0604020202020204" pitchFamily="34" charset="0"/>
+              <a:buChar char="•"/>
+              <a:defRPr sz="2600">
+                <a:solidFill>
+                  <a:srgbClr val="2C3F71"/>
+                </a:solidFill>
+                <a:latin typeface="Times New Roman"/>
+                <a:ea typeface="Times New Roman"/>
+                <a:cs typeface="Times New Roman"/>
+                <a:sym typeface="Times New Roman"/>
+              </a:defRPr>
+            </a:pPr>
+            <a:r>
+              <a:rPr lang="en-US" sz="4000" dirty="0"/>
+              <a:t>Gather sensor using actual </a:t>
+            </a:r>
+            <a:r>
+              <a:rPr lang="en-US" sz="4000" dirty="0" err="1"/>
+              <a:t>Coug</a:t>
+            </a:r>
+            <a:r>
+              <a:rPr lang="en-US" sz="4000" dirty="0"/>
+              <a:t>-UV vehicle</a:t>
+            </a:r>
+          </a:p>
+          <a:p>
+            <a:pPr marL="571500" indent="-571500">
+              <a:buFont typeface="Arial" panose="020B0604020202020204" pitchFamily="34" charset="0"/>
+              <a:buChar char="•"/>
+              <a:defRPr sz="2600">
+                <a:solidFill>
+                  <a:srgbClr val="2C3F71"/>
+                </a:solidFill>
+                <a:latin typeface="Times New Roman"/>
+                <a:ea typeface="Times New Roman"/>
+                <a:cs typeface="Times New Roman"/>
+                <a:sym typeface="Times New Roman"/>
+              </a:defRPr>
+            </a:pPr>
+            <a:r>
+              <a:rPr lang="en-US" sz="4000" dirty="0"/>
+              <a:t>Run SLAM to get estimate of state. </a:t>
+            </a:r>
+          </a:p>
+          <a:p>
+            <a:pPr marL="2057325" lvl="1" indent="-571500">
+              <a:buFont typeface="Arial" panose="020B0604020202020204" pitchFamily="34" charset="0"/>
+              <a:buChar char="•"/>
+              <a:defRPr sz="2600">
+                <a:solidFill>
+                  <a:srgbClr val="2C3F71"/>
+                </a:solidFill>
+                <a:latin typeface="Times New Roman"/>
+                <a:ea typeface="Times New Roman"/>
+                <a:cs typeface="Times New Roman"/>
+                <a:sym typeface="Times New Roman"/>
+              </a:defRPr>
+            </a:pPr>
+            <a:r>
+              <a:rPr lang="en-US" sz="4000" dirty="0"/>
+              <a:t>Use this as “ground truth” data</a:t>
+            </a:r>
+          </a:p>
+          <a:p>
+            <a:pPr marL="571500" indent="-571500">
+              <a:buFont typeface="Arial" panose="020B0604020202020204" pitchFamily="34" charset="0"/>
+              <a:buChar char="•"/>
+              <a:defRPr sz="2600">
+                <a:solidFill>
+                  <a:srgbClr val="2C3F71"/>
+                </a:solidFill>
+                <a:latin typeface="Times New Roman"/>
+                <a:ea typeface="Times New Roman"/>
+                <a:cs typeface="Times New Roman"/>
+                <a:sym typeface="Times New Roman"/>
+              </a:defRPr>
+            </a:pPr>
+            <a:r>
+              <a:rPr lang="en-US" sz="4000" dirty="0"/>
+              <a:t>Use pose data and simulation code to run </a:t>
+            </a:r>
+            <a:r>
+              <a:rPr lang="en-US" sz="4000" dirty="0" err="1"/>
+              <a:t>SysID</a:t>
+            </a:r>
+            <a:r>
+              <a:rPr lang="en-US" sz="4000" dirty="0"/>
+              <a:t> and find actual vehicle parameters</a:t>
+            </a:r>
+          </a:p>
+          <a:p>
+            <a:pPr marL="571500" indent="-571500">
+              <a:buFont typeface="Arial" panose="020B0604020202020204" pitchFamily="34" charset="0"/>
+              <a:buChar char="•"/>
+              <a:defRPr sz="2600">
+                <a:solidFill>
+                  <a:srgbClr val="2C3F71"/>
+                </a:solidFill>
+                <a:latin typeface="Times New Roman"/>
+                <a:ea typeface="Times New Roman"/>
+                <a:cs typeface="Times New Roman"/>
+                <a:sym typeface="Times New Roman"/>
+              </a:defRPr>
+            </a:pPr>
+            <a:endParaRPr sz="4000" dirty="0"/>
           </a:p>
         </p:txBody>
       </p:sp>
@@ -14373,12 +14779,18 @@
           </p:nvPr>
         </p:nvSpPr>
         <p:spPr>
+          <a:xfrm>
+            <a:off x="29391243" y="27058540"/>
+            <a:ext cx="13576030" cy="754046"/>
+          </a:xfrm>
           <a:prstGeom prst="rect">
             <a:avLst/>
           </a:prstGeom>
         </p:spPr>
         <p:txBody>
-          <a:bodyPr/>
+          <a:bodyPr>
+            <a:noAutofit/>
+          </a:bodyPr>
           <a:lstStyle/>
           <a:p>
             <a:pPr algn="ctr">
@@ -14395,7 +14807,11 @@
                 <a:sym typeface="Calibri"/>
               </a:defRPr>
             </a:pPr>
-            <a:endParaRPr/>
+            <a:r>
+              <a:rPr lang="en-US" sz="6000" dirty="0"/>
+              <a:t>Conclusion</a:t>
+            </a:r>
+            <a:endParaRPr sz="6000" dirty="0"/>
           </a:p>
         </p:txBody>
       </p:sp>
@@ -14410,15 +14826,23 @@
           </p:nvPr>
         </p:nvSpPr>
         <p:spPr>
+          <a:xfrm>
+            <a:off x="29344879" y="28014763"/>
+            <a:ext cx="13581062" cy="3963925"/>
+          </a:xfrm>
           <a:prstGeom prst="rect">
             <a:avLst/>
           </a:prstGeom>
         </p:spPr>
         <p:txBody>
-          <a:bodyPr/>
+          <a:bodyPr>
+            <a:noAutofit/>
+          </a:bodyPr>
           <a:lstStyle/>
           <a:p>
-            <a:pPr>
+            <a:pPr marL="571500" indent="-571500">
+              <a:buFont typeface="Arial" panose="020B0604020202020204" pitchFamily="34" charset="0"/>
+              <a:buChar char="•"/>
               <a:defRPr sz="2600">
                 <a:solidFill>
                   <a:srgbClr val="2C3F71"/>
@@ -14429,7 +14853,96 @@
                 <a:sym typeface="Times New Roman"/>
               </a:defRPr>
             </a:pPr>
-            <a:endParaRPr/>
+            <a:r>
+              <a:rPr lang="en-US" sz="4000" dirty="0"/>
+              <a:t>Successfully used System Identification to characterize a dynamic model for the </a:t>
+            </a:r>
+            <a:r>
+              <a:rPr lang="en-US" sz="4000" dirty="0" err="1"/>
+              <a:t>CougUV</a:t>
+            </a:r>
+            <a:endParaRPr lang="en-US" sz="4000" dirty="0"/>
+          </a:p>
+          <a:p>
+            <a:pPr marL="571500" indent="-571500">
+              <a:buFont typeface="Arial" panose="020B0604020202020204" pitchFamily="34" charset="0"/>
+              <a:buChar char="•"/>
+              <a:defRPr sz="2600">
+                <a:solidFill>
+                  <a:srgbClr val="2C3F71"/>
+                </a:solidFill>
+                <a:latin typeface="Times New Roman"/>
+                <a:ea typeface="Times New Roman"/>
+                <a:cs typeface="Times New Roman"/>
+                <a:sym typeface="Times New Roman"/>
+              </a:defRPr>
+            </a:pPr>
+            <a:r>
+              <a:rPr lang="en-US" sz="4000" dirty="0"/>
+              <a:t>Recovered 27 parameters exactly</a:t>
+            </a:r>
+          </a:p>
+          <a:p>
+            <a:pPr marL="2057325" lvl="1" indent="-571500">
+              <a:buFont typeface="Arial" panose="020B0604020202020204" pitchFamily="34" charset="0"/>
+              <a:buChar char="•"/>
+              <a:defRPr sz="2600">
+                <a:solidFill>
+                  <a:srgbClr val="2C3F71"/>
+                </a:solidFill>
+                <a:latin typeface="Times New Roman"/>
+                <a:ea typeface="Times New Roman"/>
+                <a:cs typeface="Times New Roman"/>
+                <a:sym typeface="Times New Roman"/>
+              </a:defRPr>
+            </a:pPr>
+            <a:r>
+              <a:rPr lang="en-US" sz="4000" dirty="0"/>
+              <a:t>All crucial parameters, most nice-to-have parameters</a:t>
+            </a:r>
+          </a:p>
+          <a:p>
+            <a:pPr marL="571500" indent="-571500">
+              <a:buFont typeface="Arial" panose="020B0604020202020204" pitchFamily="34" charset="0"/>
+              <a:buChar char="•"/>
+              <a:defRPr sz="2600">
+                <a:solidFill>
+                  <a:srgbClr val="2C3F71"/>
+                </a:solidFill>
+                <a:latin typeface="Times New Roman"/>
+                <a:ea typeface="Times New Roman"/>
+                <a:cs typeface="Times New Roman"/>
+                <a:sym typeface="Times New Roman"/>
+              </a:defRPr>
+            </a:pPr>
+            <a:r>
+              <a:rPr lang="en-US" sz="4000" dirty="0"/>
+              <a:t>Simulation lays groundwork for </a:t>
+            </a:r>
+            <a:r>
+              <a:rPr lang="en-US" sz="4000" dirty="0" err="1"/>
+              <a:t>SysID</a:t>
+            </a:r>
+            <a:r>
+              <a:rPr lang="en-US" sz="4000" dirty="0"/>
+              <a:t> on real vehicle</a:t>
+            </a:r>
+          </a:p>
+          <a:p>
+            <a:pPr marL="571500" indent="-571500">
+              <a:buFont typeface="Arial" panose="020B0604020202020204" pitchFamily="34" charset="0"/>
+              <a:buChar char="•"/>
+              <a:defRPr sz="2600">
+                <a:solidFill>
+                  <a:srgbClr val="2C3F71"/>
+                </a:solidFill>
+                <a:latin typeface="Times New Roman"/>
+                <a:ea typeface="Times New Roman"/>
+                <a:cs typeface="Times New Roman"/>
+                <a:sym typeface="Times New Roman"/>
+              </a:defRPr>
+            </a:pPr>
+            <a:endParaRPr lang="en-US" sz="4000" dirty="0"/>
           </a:p>
         </p:txBody>
       </p:sp>
@@ -14462,46 +14975,6 @@
       </p:sp>
       <p:sp>
         <p:nvSpPr>
-          <p:cNvPr id="225" name="Text Placeholder 16"/>
-          <p:cNvSpPr>
-            <a:spLocks noGrp="1"/>
-          </p:cNvSpPr>
-          <p:nvPr>
-            <p:ph type="body" idx="27"/>
-          </p:nvPr>
-        </p:nvSpPr>
-        <p:spPr>
-          <a:prstGeom prst="rect">
-            <a:avLst/>
-          </a:prstGeom>
-        </p:spPr>
-        <p:txBody>
-          <a:bodyPr/>
-          <a:lstStyle/>
-          <a:p>
-            <a:pPr algn="ctr">
-              <a:lnSpc>
-                <a:spcPct val="90000"/>
-              </a:lnSpc>
-              <a:spcBef>
-                <a:spcPts val="1900"/>
-              </a:spcBef>
-              <a:defRPr sz="8100">
-                <a:solidFill>
-                  <a:srgbClr val="FFFFFF"/>
-                </a:solidFill>
-                <a:latin typeface="+mj-lt"/>
-                <a:ea typeface="+mj-ea"/>
-                <a:cs typeface="+mj-cs"/>
-                <a:sym typeface="Calibri"/>
-              </a:defRPr>
-            </a:pPr>
-            <a:endParaRPr dirty="0"/>
-          </a:p>
-        </p:txBody>
-      </p:sp>
-      <p:sp>
-        <p:nvSpPr>
           <p:cNvPr id="226" name="Text Placeholder 17"/>
           <p:cNvSpPr>
             <a:spLocks noGrp="1"/>
@@ -14511,6 +14984,10 @@
           </p:nvPr>
         </p:nvSpPr>
         <p:spPr>
+          <a:xfrm>
+            <a:off x="5877605" y="1380494"/>
+            <a:ext cx="31998969" cy="1637975"/>
+          </a:xfrm>
           <a:prstGeom prst="rect">
             <a:avLst/>
           </a:prstGeom>
@@ -14523,11 +15000,11 @@
           <a:p>
             <a:r>
               <a:rPr lang="en-US" dirty="0" err="1"/>
-              <a:t>Coug</a:t>
+              <a:t>CougUV</a:t>
             </a:r>
             <a:r>
               <a:rPr lang="en-US" dirty="0"/>
-              <a:t>-UV System Identification</a:t>
+              <a:t> System Dynamics Identification in Simulation</a:t>
             </a:r>
             <a:endParaRPr dirty="0"/>
           </a:p>
@@ -14560,7 +15037,7 @@
         </p:blipFill>
         <p:spPr bwMode="auto">
           <a:xfrm>
-            <a:off x="963410" y="25021179"/>
+            <a:off x="923927" y="13991481"/>
             <a:ext cx="13571534" cy="3744322"/>
           </a:xfrm>
           <a:prstGeom prst="rect">
@@ -14576,6 +15053,755 @@
               </a14:hiddenFill>
             </a:ext>
           </a:extLst>
+        </p:spPr>
+      </p:pic>
+      <p:sp>
+        <p:nvSpPr>
+          <p:cNvPr id="2" name="TextBox 1">
+            <a:extLst>
+              <a:ext uri="{FF2B5EF4-FFF2-40B4-BE49-F238E27FC236}">
+                <a16:creationId xmlns:a16="http://schemas.microsoft.com/office/drawing/2014/main" id="{AD19FB11-CC5B-6E68-C775-67714CA20840}"/>
+              </a:ext>
+            </a:extLst>
+          </p:cNvPr>
+          <p:cNvSpPr txBox="1"/>
+          <p:nvPr/>
+        </p:nvSpPr>
+        <p:spPr>
+          <a:xfrm flipH="1">
+            <a:off x="893520" y="20618029"/>
+            <a:ext cx="13553382" cy="1015661"/>
+          </a:xfrm>
+          <a:prstGeom prst="rect">
+            <a:avLst/>
+          </a:prstGeom>
+          <a:noFill/>
+          <a:ln w="12700" cap="flat">
+            <a:noFill/>
+            <a:miter lim="400000"/>
+          </a:ln>
+          <a:effectLst/>
+          <a:sp3d/>
+        </p:spPr>
+        <p:style>
+          <a:lnRef idx="0">
+            <a:scrgbClr r="0" g="0" b="0"/>
+          </a:lnRef>
+          <a:fillRef idx="0">
+            <a:scrgbClr r="0" g="0" b="0"/>
+          </a:fillRef>
+          <a:effectRef idx="0">
+            <a:scrgbClr r="0" g="0" b="0"/>
+          </a:effectRef>
+          <a:fontRef idx="none"/>
+        </p:style>
+        <p:txBody>
+          <a:bodyPr rot="0" spcFirstLastPara="1" vertOverflow="overflow" horzOverflow="overflow" vert="horz" wrap="square" lIns="45719" tIns="45719" rIns="45719" bIns="45719" numCol="1" spcCol="38100" rtlCol="0" anchor="t">
+            <a:spAutoFit/>
+          </a:bodyPr>
+          <a:lstStyle/>
+          <a:p>
+            <a:pPr marL="0" marR="0" indent="0" algn="ctr" defTabSz="4388899" rtl="0" fontAlgn="auto" latinLnBrk="0" hangingPunct="0">
+              <a:lnSpc>
+                <a:spcPct val="100000"/>
+              </a:lnSpc>
+              <a:spcBef>
+                <a:spcPts val="0"/>
+              </a:spcBef>
+              <a:spcAft>
+                <a:spcPts val="0"/>
+              </a:spcAft>
+              <a:buClrTx/>
+              <a:buSzTx/>
+              <a:buFontTx/>
+              <a:buNone/>
+              <a:tabLst/>
+            </a:pPr>
+            <a:r>
+              <a:rPr lang="en-US" sz="6000" b="1" u="sng" dirty="0">
+                <a:solidFill>
+                  <a:srgbClr val="2C3F71"/>
+                </a:solidFill>
+              </a:rPr>
+              <a:t>Method</a:t>
+            </a:r>
+          </a:p>
+        </p:txBody>
+      </p:sp>
+      <p:sp>
+        <p:nvSpPr>
+          <p:cNvPr id="3" name="TextBox 2">
+            <a:extLst>
+              <a:ext uri="{FF2B5EF4-FFF2-40B4-BE49-F238E27FC236}">
+                <a16:creationId xmlns:a16="http://schemas.microsoft.com/office/drawing/2014/main" id="{5E577E45-CB5D-666F-ADF5-26AEF450C7D2}"/>
+              </a:ext>
+            </a:extLst>
+          </p:cNvPr>
+          <p:cNvSpPr txBox="1"/>
+          <p:nvPr/>
+        </p:nvSpPr>
+        <p:spPr>
+          <a:xfrm>
+            <a:off x="1103518" y="21745436"/>
+            <a:ext cx="13372202" cy="5016756"/>
+          </a:xfrm>
+          <a:prstGeom prst="rect">
+            <a:avLst/>
+          </a:prstGeom>
+          <a:noFill/>
+          <a:ln w="12700" cap="flat">
+            <a:noFill/>
+            <a:miter lim="400000"/>
+          </a:ln>
+          <a:effectLst/>
+          <a:sp3d/>
+        </p:spPr>
+        <p:style>
+          <a:lnRef idx="0">
+            <a:scrgbClr r="0" g="0" b="0"/>
+          </a:lnRef>
+          <a:fillRef idx="0">
+            <a:scrgbClr r="0" g="0" b="0"/>
+          </a:fillRef>
+          <a:effectRef idx="0">
+            <a:scrgbClr r="0" g="0" b="0"/>
+          </a:effectRef>
+          <a:fontRef idx="none"/>
+        </p:style>
+        <p:txBody>
+          <a:bodyPr rot="0" spcFirstLastPara="1" vertOverflow="overflow" horzOverflow="overflow" vert="horz" wrap="square" lIns="45719" tIns="45719" rIns="45719" bIns="45719" numCol="1" spcCol="38100" rtlCol="0" anchor="t">
+            <a:spAutoFit/>
+          </a:bodyPr>
+          <a:lstStyle/>
+          <a:p>
+            <a:pPr marL="0" marR="0" indent="0" algn="l" defTabSz="4388899" rtl="0" fontAlgn="auto" latinLnBrk="0" hangingPunct="0">
+              <a:lnSpc>
+                <a:spcPct val="100000"/>
+              </a:lnSpc>
+              <a:spcBef>
+                <a:spcPts val="0"/>
+              </a:spcBef>
+              <a:spcAft>
+                <a:spcPts val="0"/>
+              </a:spcAft>
+              <a:buClrTx/>
+              <a:buSzTx/>
+              <a:buFontTx/>
+              <a:buNone/>
+              <a:tabLst/>
+            </a:pPr>
+            <a:r>
+              <a:rPr lang="en-US" sz="4000" b="1" u="sng" dirty="0">
+                <a:solidFill>
+                  <a:srgbClr val="2C3F71"/>
+                </a:solidFill>
+                <a:latin typeface="Times New Roman"/>
+                <a:cs typeface="Times New Roman"/>
+              </a:rPr>
+              <a:t>Simulated Problem</a:t>
+            </a:r>
+            <a:r>
+              <a:rPr lang="en-US" sz="4000" dirty="0">
+                <a:solidFill>
+                  <a:srgbClr val="2C3F71"/>
+                </a:solidFill>
+                <a:latin typeface="Times New Roman"/>
+                <a:cs typeface="Times New Roman"/>
+              </a:rPr>
+              <a:t>: </a:t>
+            </a:r>
+          </a:p>
+          <a:p>
+            <a:pPr marL="571500" marR="0" indent="-571500" algn="l" defTabSz="4388899" rtl="0" fontAlgn="auto" latinLnBrk="0" hangingPunct="0">
+              <a:lnSpc>
+                <a:spcPct val="100000"/>
+              </a:lnSpc>
+              <a:spcBef>
+                <a:spcPts val="0"/>
+              </a:spcBef>
+              <a:spcAft>
+                <a:spcPts val="0"/>
+              </a:spcAft>
+              <a:buClrTx/>
+              <a:buSzTx/>
+              <a:buFont typeface="Arial" panose="020B0604020202020204" pitchFamily="34" charset="0"/>
+              <a:buChar char="•"/>
+              <a:tabLst/>
+            </a:pPr>
+            <a:r>
+              <a:rPr lang="en-US" sz="4000" dirty="0">
+                <a:solidFill>
+                  <a:srgbClr val="2C3F71"/>
+                </a:solidFill>
+                <a:latin typeface="Times New Roman"/>
+                <a:cs typeface="Times New Roman"/>
+              </a:rPr>
+              <a:t>Implement vehicle dynamics in Python</a:t>
+            </a:r>
+          </a:p>
+          <a:p>
+            <a:pPr marL="571500" marR="0" indent="-571500" algn="l" defTabSz="4388899" rtl="0" fontAlgn="auto" latinLnBrk="0" hangingPunct="0">
+              <a:lnSpc>
+                <a:spcPct val="100000"/>
+              </a:lnSpc>
+              <a:spcBef>
+                <a:spcPts val="0"/>
+              </a:spcBef>
+              <a:spcAft>
+                <a:spcPts val="0"/>
+              </a:spcAft>
+              <a:buClrTx/>
+              <a:buSzTx/>
+              <a:buFont typeface="Arial" panose="020B0604020202020204" pitchFamily="34" charset="0"/>
+              <a:buChar char="•"/>
+              <a:tabLst/>
+            </a:pPr>
+            <a:r>
+              <a:rPr lang="en-US" sz="4000" dirty="0">
+                <a:solidFill>
+                  <a:srgbClr val="2C3F71"/>
+                </a:solidFill>
+                <a:latin typeface="Times New Roman"/>
+                <a:cs typeface="Times New Roman"/>
+              </a:rPr>
+              <a:t>Input to </a:t>
+            </a:r>
+            <a:r>
+              <a:rPr lang="en-US" sz="4000" dirty="0" err="1">
+                <a:solidFill>
+                  <a:srgbClr val="2C3F71"/>
+                </a:solidFill>
+                <a:latin typeface="Times New Roman"/>
+                <a:cs typeface="Times New Roman"/>
+              </a:rPr>
+              <a:t>SysID</a:t>
+            </a:r>
+            <a:r>
+              <a:rPr lang="en-US" sz="4000" dirty="0">
+                <a:solidFill>
+                  <a:srgbClr val="2C3F71"/>
+                </a:solidFill>
+                <a:latin typeface="Times New Roman"/>
+                <a:cs typeface="Times New Roman"/>
+              </a:rPr>
+              <a:t>: list of control commands at each time step</a:t>
+            </a:r>
+          </a:p>
+          <a:p>
+            <a:pPr marL="571500" marR="0" indent="-571500" algn="l" defTabSz="4388899" rtl="0" fontAlgn="auto" latinLnBrk="0" hangingPunct="0">
+              <a:lnSpc>
+                <a:spcPct val="100000"/>
+              </a:lnSpc>
+              <a:spcBef>
+                <a:spcPts val="0"/>
+              </a:spcBef>
+              <a:spcAft>
+                <a:spcPts val="0"/>
+              </a:spcAft>
+              <a:buClrTx/>
+              <a:buSzTx/>
+              <a:buFont typeface="Arial" panose="020B0604020202020204" pitchFamily="34" charset="0"/>
+              <a:buChar char="•"/>
+              <a:tabLst/>
+            </a:pPr>
+            <a:r>
+              <a:rPr lang="en-US" sz="4000" dirty="0">
+                <a:solidFill>
+                  <a:srgbClr val="2C3F71"/>
+                </a:solidFill>
+                <a:latin typeface="Times New Roman"/>
+                <a:cs typeface="Times New Roman"/>
+              </a:rPr>
+              <a:t>Data: simulate full vehicle behavior with true parameters</a:t>
+            </a:r>
+          </a:p>
+          <a:p>
+            <a:pPr marL="571500" marR="0" indent="-571500" algn="l" defTabSz="4388899" rtl="0" fontAlgn="auto" latinLnBrk="0" hangingPunct="0">
+              <a:lnSpc>
+                <a:spcPct val="100000"/>
+              </a:lnSpc>
+              <a:spcBef>
+                <a:spcPts val="0"/>
+              </a:spcBef>
+              <a:spcAft>
+                <a:spcPts val="0"/>
+              </a:spcAft>
+              <a:buClrTx/>
+              <a:buSzTx/>
+              <a:buFont typeface="Arial" panose="020B0604020202020204" pitchFamily="34" charset="0"/>
+              <a:buChar char="•"/>
+              <a:tabLst/>
+            </a:pPr>
+            <a:r>
+              <a:rPr lang="en-US" sz="4000" dirty="0">
+                <a:solidFill>
+                  <a:srgbClr val="2C3F71"/>
+                </a:solidFill>
+                <a:latin typeface="Times New Roman"/>
+                <a:cs typeface="Times New Roman"/>
+              </a:rPr>
+              <a:t>Initialize desired parameters to incorrect values</a:t>
+            </a:r>
+          </a:p>
+          <a:p>
+            <a:pPr marL="571500" marR="0" indent="-571500" algn="l" defTabSz="4388899" rtl="0" fontAlgn="auto" latinLnBrk="0" hangingPunct="0">
+              <a:lnSpc>
+                <a:spcPct val="100000"/>
+              </a:lnSpc>
+              <a:spcBef>
+                <a:spcPts val="0"/>
+              </a:spcBef>
+              <a:spcAft>
+                <a:spcPts val="0"/>
+              </a:spcAft>
+              <a:buClrTx/>
+              <a:buSzTx/>
+              <a:buFont typeface="Arial" panose="020B0604020202020204" pitchFamily="34" charset="0"/>
+              <a:buChar char="•"/>
+              <a:tabLst/>
+            </a:pPr>
+            <a:r>
+              <a:rPr lang="en-US" sz="4000" dirty="0">
+                <a:solidFill>
+                  <a:srgbClr val="2C3F71"/>
+                </a:solidFill>
+                <a:latin typeface="Times New Roman"/>
+                <a:cs typeface="Times New Roman"/>
+              </a:rPr>
+              <a:t>At each iteration: simulate behavior from inputs using current parameters and compare to data from true parameters</a:t>
+            </a:r>
+          </a:p>
+          <a:p>
+            <a:pPr marL="571500" marR="0" indent="-571500" algn="l" defTabSz="4388899" rtl="0" fontAlgn="auto" latinLnBrk="0" hangingPunct="0">
+              <a:lnSpc>
+                <a:spcPct val="100000"/>
+              </a:lnSpc>
+              <a:spcBef>
+                <a:spcPts val="0"/>
+              </a:spcBef>
+              <a:spcAft>
+                <a:spcPts val="0"/>
+              </a:spcAft>
+              <a:buClrTx/>
+              <a:buSzTx/>
+              <a:buFont typeface="Arial" panose="020B0604020202020204" pitchFamily="34" charset="0"/>
+              <a:buChar char="•"/>
+              <a:tabLst/>
+            </a:pPr>
+            <a:r>
+              <a:rPr lang="en-US" sz="4000" dirty="0">
+                <a:solidFill>
+                  <a:srgbClr val="2C3F71"/>
+                </a:solidFill>
+                <a:latin typeface="Times New Roman"/>
+                <a:cs typeface="Times New Roman"/>
+              </a:rPr>
+              <a:t>Optimizer calculates gradient and adjusts parameters</a:t>
+            </a:r>
+          </a:p>
+        </p:txBody>
+      </p:sp>
+      <p:pic>
+        <p:nvPicPr>
+          <p:cNvPr id="4" name="Picture 3">
+            <a:extLst>
+              <a:ext uri="{FF2B5EF4-FFF2-40B4-BE49-F238E27FC236}">
+                <a16:creationId xmlns:a16="http://schemas.microsoft.com/office/drawing/2014/main" id="{36FE4BF2-DCB0-B34C-8D65-846739E3ECEC}"/>
+              </a:ext>
+            </a:extLst>
+          </p:cNvPr>
+          <p:cNvPicPr>
+            <a:picLocks noChangeAspect="1"/>
+          </p:cNvPicPr>
+          <p:nvPr/>
+        </p:nvPicPr>
+        <p:blipFill>
+          <a:blip r:embed="rId3"/>
+          <a:srcRect b="37303"/>
+          <a:stretch/>
+        </p:blipFill>
+        <p:spPr>
+          <a:xfrm>
+            <a:off x="942079" y="27221941"/>
+            <a:ext cx="13553382" cy="2693572"/>
+          </a:xfrm>
+          <a:prstGeom prst="rect">
+            <a:avLst/>
+          </a:prstGeom>
+        </p:spPr>
+      </p:pic>
+      <p:pic>
+        <p:nvPicPr>
+          <p:cNvPr id="5" name="Picture 4">
+            <a:extLst>
+              <a:ext uri="{FF2B5EF4-FFF2-40B4-BE49-F238E27FC236}">
+                <a16:creationId xmlns:a16="http://schemas.microsoft.com/office/drawing/2014/main" id="{86EDCE09-0328-28DA-35EF-DC450176561F}"/>
+              </a:ext>
+            </a:extLst>
+          </p:cNvPr>
+          <p:cNvPicPr>
+            <a:picLocks noChangeAspect="1"/>
+          </p:cNvPicPr>
+          <p:nvPr/>
+        </p:nvPicPr>
+        <p:blipFill>
+          <a:blip r:embed="rId3"/>
+          <a:srcRect t="78065"/>
+          <a:stretch/>
+        </p:blipFill>
+        <p:spPr>
+          <a:xfrm>
+            <a:off x="942079" y="29783749"/>
+            <a:ext cx="13553382" cy="942368"/>
+          </a:xfrm>
+          <a:prstGeom prst="rect">
+            <a:avLst/>
+          </a:prstGeom>
+        </p:spPr>
+      </p:pic>
+      <p:pic>
+        <p:nvPicPr>
+          <p:cNvPr id="6" name="Picture 5">
+            <a:extLst>
+              <a:ext uri="{FF2B5EF4-FFF2-40B4-BE49-F238E27FC236}">
+                <a16:creationId xmlns:a16="http://schemas.microsoft.com/office/drawing/2014/main" id="{F9B4A47A-D02D-ECB2-C529-BACD1B3C9B69}"/>
+              </a:ext>
+            </a:extLst>
+          </p:cNvPr>
+          <p:cNvPicPr>
+            <a:picLocks noChangeAspect="1"/>
+          </p:cNvPicPr>
+          <p:nvPr/>
+        </p:nvPicPr>
+        <p:blipFill>
+          <a:blip r:embed="rId4"/>
+          <a:srcRect l="33706" r="936"/>
+          <a:stretch/>
+        </p:blipFill>
+        <p:spPr>
+          <a:xfrm>
+            <a:off x="15410513" y="25769833"/>
+            <a:ext cx="13019314" cy="6149948"/>
+          </a:xfrm>
+          <a:prstGeom prst="rect">
+            <a:avLst/>
+          </a:prstGeom>
+        </p:spPr>
+      </p:pic>
+      <p:sp>
+        <p:nvSpPr>
+          <p:cNvPr id="10" name="TextBox 9">
+            <a:extLst>
+              <a:ext uri="{FF2B5EF4-FFF2-40B4-BE49-F238E27FC236}">
+                <a16:creationId xmlns:a16="http://schemas.microsoft.com/office/drawing/2014/main" id="{DBEEC7D2-EBA9-AFDB-10E5-0EFECDFD70A0}"/>
+              </a:ext>
+            </a:extLst>
+          </p:cNvPr>
+          <p:cNvSpPr txBox="1"/>
+          <p:nvPr/>
+        </p:nvSpPr>
+        <p:spPr>
+          <a:xfrm>
+            <a:off x="16067312" y="23215288"/>
+            <a:ext cx="5809776" cy="2554545"/>
+          </a:xfrm>
+          <a:prstGeom prst="rect">
+            <a:avLst/>
+          </a:prstGeom>
+          <a:noFill/>
+          <a:ln w="12700" cap="flat">
+            <a:noFill/>
+            <a:miter lim="400000"/>
+          </a:ln>
+          <a:effectLst/>
+          <a:sp3d/>
+        </p:spPr>
+        <p:style>
+          <a:lnRef idx="0">
+            <a:scrgbClr r="0" g="0" b="0"/>
+          </a:lnRef>
+          <a:fillRef idx="0">
+            <a:scrgbClr r="0" g="0" b="0"/>
+          </a:fillRef>
+          <a:effectRef idx="0">
+            <a:scrgbClr r="0" g="0" b="0"/>
+          </a:effectRef>
+          <a:fontRef idx="none"/>
+        </p:style>
+        <p:txBody>
+          <a:bodyPr wrap="square">
+            <a:spAutoFit/>
+          </a:bodyPr>
+          <a:lstStyle/>
+          <a:p>
+            <a:pPr>
+              <a:defRPr sz="2600">
+                <a:solidFill>
+                  <a:srgbClr val="2C3F71"/>
+                </a:solidFill>
+                <a:latin typeface="Times New Roman"/>
+                <a:ea typeface="Times New Roman"/>
+                <a:cs typeface="Times New Roman"/>
+                <a:sym typeface="Times New Roman"/>
+              </a:defRPr>
+            </a:pPr>
+            <a:r>
+              <a:rPr lang="en-US" sz="4000" b="1" u="sng" dirty="0"/>
+              <a:t>Performance</a:t>
+            </a:r>
+            <a:r>
+              <a:rPr lang="en-US" sz="4000" u="sng" dirty="0"/>
+              <a:t>: </a:t>
+            </a:r>
+          </a:p>
+          <a:p>
+            <a:pPr marL="571500" indent="-571500">
+              <a:buFont typeface="Arial" panose="020B0604020202020204" pitchFamily="34" charset="0"/>
+              <a:buChar char="•"/>
+              <a:defRPr sz="2600">
+                <a:solidFill>
+                  <a:srgbClr val="2C3F71"/>
+                </a:solidFill>
+                <a:latin typeface="Times New Roman"/>
+                <a:ea typeface="Times New Roman"/>
+                <a:cs typeface="Times New Roman"/>
+                <a:sym typeface="Times New Roman"/>
+              </a:defRPr>
+            </a:pPr>
+            <a:r>
+              <a:rPr lang="en-US" sz="4000" dirty="0"/>
+              <a:t>MSE: </a:t>
+            </a:r>
+            <a:r>
+              <a:rPr lang="en-US" sz="4000" dirty="0">
+                <a:solidFill>
+                  <a:srgbClr val="00B050"/>
+                </a:solidFill>
+              </a:rPr>
+              <a:t>1.618e-7</a:t>
+            </a:r>
+          </a:p>
+          <a:p>
+            <a:pPr marL="571500" indent="-571500">
+              <a:buFont typeface="Arial" panose="020B0604020202020204" pitchFamily="34" charset="0"/>
+              <a:buChar char="•"/>
+              <a:defRPr sz="2600">
+                <a:solidFill>
+                  <a:srgbClr val="2C3F71"/>
+                </a:solidFill>
+                <a:latin typeface="Times New Roman"/>
+                <a:ea typeface="Times New Roman"/>
+                <a:cs typeface="Times New Roman"/>
+                <a:sym typeface="Times New Roman"/>
+              </a:defRPr>
+            </a:pPr>
+            <a:r>
+              <a:rPr lang="en-US" sz="4000" dirty="0"/>
+              <a:t>Iterations: 13368</a:t>
+            </a:r>
+          </a:p>
+          <a:p>
+            <a:pPr marL="571500" indent="-571500">
+              <a:buFont typeface="Arial" panose="020B0604020202020204" pitchFamily="34" charset="0"/>
+              <a:buChar char="•"/>
+              <a:defRPr sz="2600">
+                <a:solidFill>
+                  <a:srgbClr val="2C3F71"/>
+                </a:solidFill>
+                <a:latin typeface="Times New Roman"/>
+                <a:ea typeface="Times New Roman"/>
+                <a:cs typeface="Times New Roman"/>
+                <a:sym typeface="Times New Roman"/>
+              </a:defRPr>
+            </a:pPr>
+            <a:r>
+              <a:rPr lang="en-US" sz="4000" dirty="0"/>
+              <a:t>Runtime: 10.5 minutes</a:t>
+            </a:r>
+          </a:p>
+        </p:txBody>
+      </p:sp>
+      <p:sp>
+        <p:nvSpPr>
+          <p:cNvPr id="13" name="TextBox 12">
+            <a:extLst>
+              <a:ext uri="{FF2B5EF4-FFF2-40B4-BE49-F238E27FC236}">
+                <a16:creationId xmlns:a16="http://schemas.microsoft.com/office/drawing/2014/main" id="{5528B438-AE19-B961-5C06-A0D778517527}"/>
+              </a:ext>
+            </a:extLst>
+          </p:cNvPr>
+          <p:cNvSpPr txBox="1"/>
+          <p:nvPr/>
+        </p:nvSpPr>
+        <p:spPr>
+          <a:xfrm>
+            <a:off x="22377971" y="23215288"/>
+            <a:ext cx="6261879" cy="2554545"/>
+          </a:xfrm>
+          <a:prstGeom prst="rect">
+            <a:avLst/>
+          </a:prstGeom>
+          <a:noFill/>
+          <a:ln w="12700" cap="flat">
+            <a:noFill/>
+            <a:miter lim="400000"/>
+          </a:ln>
+          <a:effectLst/>
+          <a:sp3d/>
+        </p:spPr>
+        <p:style>
+          <a:lnRef idx="0">
+            <a:scrgbClr r="0" g="0" b="0"/>
+          </a:lnRef>
+          <a:fillRef idx="0">
+            <a:scrgbClr r="0" g="0" b="0"/>
+          </a:fillRef>
+          <a:effectRef idx="0">
+            <a:scrgbClr r="0" g="0" b="0"/>
+          </a:effectRef>
+          <a:fontRef idx="none"/>
+        </p:style>
+        <p:txBody>
+          <a:bodyPr wrap="square">
+            <a:spAutoFit/>
+          </a:bodyPr>
+          <a:lstStyle/>
+          <a:p>
+            <a:pPr>
+              <a:defRPr sz="2600">
+                <a:solidFill>
+                  <a:srgbClr val="2C3F71"/>
+                </a:solidFill>
+                <a:latin typeface="Times New Roman"/>
+                <a:ea typeface="Times New Roman"/>
+                <a:cs typeface="Times New Roman"/>
+                <a:sym typeface="Times New Roman"/>
+              </a:defRPr>
+            </a:pPr>
+            <a:r>
+              <a:rPr lang="en-US" sz="4000" b="1" u="sng" dirty="0"/>
+              <a:t>With 22 parameters:</a:t>
+            </a:r>
+            <a:r>
+              <a:rPr lang="en-US" sz="4000" dirty="0"/>
+              <a:t> </a:t>
+            </a:r>
+          </a:p>
+          <a:p>
+            <a:pPr marL="571500" indent="-571500">
+              <a:buFont typeface="Arial" panose="020B0604020202020204" pitchFamily="34" charset="0"/>
+              <a:buChar char="•"/>
+              <a:defRPr sz="2600">
+                <a:solidFill>
+                  <a:srgbClr val="2C3F71"/>
+                </a:solidFill>
+                <a:latin typeface="Times New Roman"/>
+                <a:ea typeface="Times New Roman"/>
+                <a:cs typeface="Times New Roman"/>
+                <a:sym typeface="Times New Roman"/>
+              </a:defRPr>
+            </a:pPr>
+            <a:r>
+              <a:rPr lang="en-US" sz="4000" dirty="0"/>
+              <a:t>MSE: 2.62e-9</a:t>
+            </a:r>
+          </a:p>
+          <a:p>
+            <a:pPr marL="571500" indent="-571500">
+              <a:buFont typeface="Arial" panose="020B0604020202020204" pitchFamily="34" charset="0"/>
+              <a:buChar char="•"/>
+              <a:defRPr sz="2600">
+                <a:solidFill>
+                  <a:srgbClr val="2C3F71"/>
+                </a:solidFill>
+                <a:latin typeface="Times New Roman"/>
+                <a:ea typeface="Times New Roman"/>
+                <a:cs typeface="Times New Roman"/>
+                <a:sym typeface="Times New Roman"/>
+              </a:defRPr>
+            </a:pPr>
+            <a:r>
+              <a:rPr lang="en-US" sz="4000" dirty="0"/>
+              <a:t>Iterations: 1146</a:t>
+            </a:r>
+          </a:p>
+          <a:p>
+            <a:pPr marL="571500" indent="-571500">
+              <a:buFont typeface="Arial" panose="020B0604020202020204" pitchFamily="34" charset="0"/>
+              <a:buChar char="•"/>
+              <a:defRPr sz="2600">
+                <a:solidFill>
+                  <a:srgbClr val="2C3F71"/>
+                </a:solidFill>
+                <a:latin typeface="Times New Roman"/>
+                <a:ea typeface="Times New Roman"/>
+                <a:cs typeface="Times New Roman"/>
+                <a:sym typeface="Times New Roman"/>
+              </a:defRPr>
+            </a:pPr>
+            <a:r>
+              <a:rPr lang="en-US" sz="4000" dirty="0"/>
+              <a:t>Runtime: 0.5 mins</a:t>
+            </a:r>
+          </a:p>
+        </p:txBody>
+      </p:sp>
+      <p:pic>
+        <p:nvPicPr>
+          <p:cNvPr id="9" name="Picture 8">
+            <a:extLst>
+              <a:ext uri="{FF2B5EF4-FFF2-40B4-BE49-F238E27FC236}">
+                <a16:creationId xmlns:a16="http://schemas.microsoft.com/office/drawing/2014/main" id="{BC7E95FC-EF35-9758-9737-A24C24B16427}"/>
+              </a:ext>
+            </a:extLst>
+          </p:cNvPr>
+          <p:cNvPicPr>
+            <a:picLocks noChangeAspect="1"/>
+          </p:cNvPicPr>
+          <p:nvPr/>
+        </p:nvPicPr>
+        <p:blipFill>
+          <a:blip r:embed="rId5"/>
+          <a:srcRect r="32740"/>
+          <a:stretch/>
+        </p:blipFill>
+        <p:spPr>
+          <a:xfrm>
+            <a:off x="15248178" y="10765522"/>
+            <a:ext cx="13391672" cy="6124019"/>
+          </a:xfrm>
+          <a:prstGeom prst="rect">
+            <a:avLst/>
+          </a:prstGeom>
+        </p:spPr>
+      </p:pic>
+      <p:pic>
+        <p:nvPicPr>
+          <p:cNvPr id="12" name="Picture 11">
+            <a:extLst>
+              <a:ext uri="{FF2B5EF4-FFF2-40B4-BE49-F238E27FC236}">
+                <a16:creationId xmlns:a16="http://schemas.microsoft.com/office/drawing/2014/main" id="{41AB9B41-5901-0B10-14FB-2A13E06148C1}"/>
+              </a:ext>
+            </a:extLst>
+          </p:cNvPr>
+          <p:cNvPicPr>
+            <a:picLocks noChangeAspect="1"/>
+          </p:cNvPicPr>
+          <p:nvPr/>
+        </p:nvPicPr>
+        <p:blipFill>
+          <a:blip r:embed="rId5"/>
+          <a:srcRect l="66711"/>
+          <a:stretch/>
+        </p:blipFill>
+        <p:spPr>
+          <a:xfrm>
+            <a:off x="18972200" y="16892120"/>
+            <a:ext cx="6654445" cy="6148516"/>
+          </a:xfrm>
+          <a:prstGeom prst="rect">
+            <a:avLst/>
+          </a:prstGeom>
         </p:spPr>
       </p:pic>
     </p:spTree>

</xml_diff>